<commit_message>
added Landmarks-BFS.ipynb, wildlife_classification.ipynb and others
</commit_message>
<xml_diff>
--- a/6семестр/Теория конечных графов/Отчёт по проекту.pptx
+++ b/6семестр/Теория конечных графов/Отчёт по проекту.pptx
@@ -4,10 +4,20 @@
   <p:sldMasterIdLst>
     <p:sldMasterId id="2147483660" r:id="rId1"/>
   </p:sldMasterIdLst>
+  <p:notesMasterIdLst>
+    <p:notesMasterId r:id="rId12"/>
+  </p:notesMasterIdLst>
   <p:sldIdLst>
     <p:sldId id="256" r:id="rId2"/>
     <p:sldId id="257" r:id="rId3"/>
     <p:sldId id="258" r:id="rId4"/>
+    <p:sldId id="259" r:id="rId5"/>
+    <p:sldId id="261" r:id="rId6"/>
+    <p:sldId id="262" r:id="rId7"/>
+    <p:sldId id="263" r:id="rId8"/>
+    <p:sldId id="264" r:id="rId9"/>
+    <p:sldId id="265" r:id="rId10"/>
+    <p:sldId id="260" r:id="rId11"/>
   </p:sldIdLst>
   <p:sldSz cx="12192000" cy="6858000"/>
   <p:notesSz cx="6858000" cy="9144000"/>
@@ -106,7 +116,446 @@
       </a:defRPr>
     </a:lvl9pPr>
   </p:defaultTextStyle>
+  <p:extLst>
+    <p:ext uri="{EFAFB233-063F-42B5-8137-9DF3F51BA10A}">
+      <p15:sldGuideLst xmlns:p15="http://schemas.microsoft.com/office/powerpoint/2012/main"/>
+    </p:ext>
+  </p:extLst>
 </p:presentation>
+</file>
+
+<file path=ppt/notesMasters/notesMaster1.xml><?xml version="1.0" encoding="utf-8"?>
+<p:notesMaster xmlns:a="http://schemas.openxmlformats.org/drawingml/2006/main" xmlns:r="http://schemas.openxmlformats.org/officeDocument/2006/relationships" xmlns:p="http://schemas.openxmlformats.org/presentationml/2006/main">
+  <p:cSld>
+    <p:bg>
+      <p:bgRef idx="1001">
+        <a:schemeClr val="bg1"/>
+      </p:bgRef>
+    </p:bg>
+    <p:spTree>
+      <p:nvGrpSpPr>
+        <p:cNvPr id="1" name=""/>
+        <p:cNvGrpSpPr/>
+        <p:nvPr/>
+      </p:nvGrpSpPr>
+      <p:grpSpPr>
+        <a:xfrm>
+          <a:off x="0" y="0"/>
+          <a:ext cx="0" cy="0"/>
+          <a:chOff x="0" y="0"/>
+          <a:chExt cx="0" cy="0"/>
+        </a:xfrm>
+      </p:grpSpPr>
+      <p:sp>
+        <p:nvSpPr>
+          <p:cNvPr id="2" name="Верхний колонтитул 1"/>
+          <p:cNvSpPr>
+            <a:spLocks noGrp="1"/>
+          </p:cNvSpPr>
+          <p:nvPr>
+            <p:ph type="hdr" sz="quarter"/>
+          </p:nvPr>
+        </p:nvSpPr>
+        <p:spPr>
+          <a:xfrm>
+            <a:off x="0" y="0"/>
+            <a:ext cx="2971800" cy="458788"/>
+          </a:xfrm>
+          <a:prstGeom prst="rect">
+            <a:avLst/>
+          </a:prstGeom>
+        </p:spPr>
+        <p:txBody>
+          <a:bodyPr vert="horz" lIns="91440" tIns="45720" rIns="91440" bIns="45720" rtlCol="0"/>
+          <a:lstStyle>
+            <a:lvl1pPr algn="l">
+              <a:defRPr sz="1200"/>
+            </a:lvl1pPr>
+          </a:lstStyle>
+          <a:p>
+            <a:endParaRPr lang="ru-RU"/>
+          </a:p>
+        </p:txBody>
+      </p:sp>
+      <p:sp>
+        <p:nvSpPr>
+          <p:cNvPr id="3" name="Дата 2"/>
+          <p:cNvSpPr>
+            <a:spLocks noGrp="1"/>
+          </p:cNvSpPr>
+          <p:nvPr>
+            <p:ph type="dt" idx="1"/>
+          </p:nvPr>
+        </p:nvSpPr>
+        <p:spPr>
+          <a:xfrm>
+            <a:off x="3884613" y="0"/>
+            <a:ext cx="2971800" cy="458788"/>
+          </a:xfrm>
+          <a:prstGeom prst="rect">
+            <a:avLst/>
+          </a:prstGeom>
+        </p:spPr>
+        <p:txBody>
+          <a:bodyPr vert="horz" lIns="91440" tIns="45720" rIns="91440" bIns="45720" rtlCol="0"/>
+          <a:lstStyle>
+            <a:lvl1pPr algn="r">
+              <a:defRPr sz="1200"/>
+            </a:lvl1pPr>
+          </a:lstStyle>
+          <a:p>
+            <a:fld id="{F8082637-EBE7-48A9-9099-838FF33BA100}" type="datetimeFigureOut">
+              <a:rPr lang="ru-RU" smtClean="0"/>
+              <a:t>20.04.2022</a:t>
+            </a:fld>
+            <a:endParaRPr lang="ru-RU"/>
+          </a:p>
+        </p:txBody>
+      </p:sp>
+      <p:sp>
+        <p:nvSpPr>
+          <p:cNvPr id="4" name="Образ слайда 3"/>
+          <p:cNvSpPr>
+            <a:spLocks noGrp="1" noRot="1" noChangeAspect="1"/>
+          </p:cNvSpPr>
+          <p:nvPr>
+            <p:ph type="sldImg" idx="2"/>
+          </p:nvPr>
+        </p:nvSpPr>
+        <p:spPr>
+          <a:xfrm>
+            <a:off x="685800" y="1143000"/>
+            <a:ext cx="5486400" cy="3086100"/>
+          </a:xfrm>
+          <a:prstGeom prst="rect">
+            <a:avLst/>
+          </a:prstGeom>
+          <a:noFill/>
+          <a:ln w="12700">
+            <a:solidFill>
+              <a:prstClr val="black"/>
+            </a:solidFill>
+          </a:ln>
+        </p:spPr>
+        <p:txBody>
+          <a:bodyPr vert="horz" lIns="91440" tIns="45720" rIns="91440" bIns="45720" rtlCol="0" anchor="ctr"/>
+          <a:lstStyle/>
+          <a:p>
+            <a:endParaRPr lang="ru-RU"/>
+          </a:p>
+        </p:txBody>
+      </p:sp>
+      <p:sp>
+        <p:nvSpPr>
+          <p:cNvPr id="5" name="Заметки 4"/>
+          <p:cNvSpPr>
+            <a:spLocks noGrp="1"/>
+          </p:cNvSpPr>
+          <p:nvPr>
+            <p:ph type="body" sz="quarter" idx="3"/>
+          </p:nvPr>
+        </p:nvSpPr>
+        <p:spPr>
+          <a:xfrm>
+            <a:off x="685800" y="4400550"/>
+            <a:ext cx="5486400" cy="3600450"/>
+          </a:xfrm>
+          <a:prstGeom prst="rect">
+            <a:avLst/>
+          </a:prstGeom>
+        </p:spPr>
+        <p:txBody>
+          <a:bodyPr vert="horz" lIns="91440" tIns="45720" rIns="91440" bIns="45720" rtlCol="0"/>
+          <a:lstStyle/>
+          <a:p>
+            <a:pPr lvl="0"/>
+            <a:r>
+              <a:rPr lang="ru-RU" smtClean="0"/>
+              <a:t>Образец текста</a:t>
+            </a:r>
+          </a:p>
+          <a:p>
+            <a:pPr lvl="1"/>
+            <a:r>
+              <a:rPr lang="ru-RU" smtClean="0"/>
+              <a:t>Второй уровень</a:t>
+            </a:r>
+          </a:p>
+          <a:p>
+            <a:pPr lvl="2"/>
+            <a:r>
+              <a:rPr lang="ru-RU" smtClean="0"/>
+              <a:t>Третий уровень</a:t>
+            </a:r>
+          </a:p>
+          <a:p>
+            <a:pPr lvl="3"/>
+            <a:r>
+              <a:rPr lang="ru-RU" smtClean="0"/>
+              <a:t>Четвертый уровень</a:t>
+            </a:r>
+          </a:p>
+          <a:p>
+            <a:pPr lvl="4"/>
+            <a:r>
+              <a:rPr lang="ru-RU" smtClean="0"/>
+              <a:t>Пятый уровень</a:t>
+            </a:r>
+            <a:endParaRPr lang="ru-RU"/>
+          </a:p>
+        </p:txBody>
+      </p:sp>
+      <p:sp>
+        <p:nvSpPr>
+          <p:cNvPr id="6" name="Нижний колонтитул 5"/>
+          <p:cNvSpPr>
+            <a:spLocks noGrp="1"/>
+          </p:cNvSpPr>
+          <p:nvPr>
+            <p:ph type="ftr" sz="quarter" idx="4"/>
+          </p:nvPr>
+        </p:nvSpPr>
+        <p:spPr>
+          <a:xfrm>
+            <a:off x="0" y="8685213"/>
+            <a:ext cx="2971800" cy="458787"/>
+          </a:xfrm>
+          <a:prstGeom prst="rect">
+            <a:avLst/>
+          </a:prstGeom>
+        </p:spPr>
+        <p:txBody>
+          <a:bodyPr vert="horz" lIns="91440" tIns="45720" rIns="91440" bIns="45720" rtlCol="0" anchor="b"/>
+          <a:lstStyle>
+            <a:lvl1pPr algn="l">
+              <a:defRPr sz="1200"/>
+            </a:lvl1pPr>
+          </a:lstStyle>
+          <a:p>
+            <a:endParaRPr lang="ru-RU"/>
+          </a:p>
+        </p:txBody>
+      </p:sp>
+      <p:sp>
+        <p:nvSpPr>
+          <p:cNvPr id="7" name="Номер слайда 6"/>
+          <p:cNvSpPr>
+            <a:spLocks noGrp="1"/>
+          </p:cNvSpPr>
+          <p:nvPr>
+            <p:ph type="sldNum" sz="quarter" idx="5"/>
+          </p:nvPr>
+        </p:nvSpPr>
+        <p:spPr>
+          <a:xfrm>
+            <a:off x="3884613" y="8685213"/>
+            <a:ext cx="2971800" cy="458787"/>
+          </a:xfrm>
+          <a:prstGeom prst="rect">
+            <a:avLst/>
+          </a:prstGeom>
+        </p:spPr>
+        <p:txBody>
+          <a:bodyPr vert="horz" lIns="91440" tIns="45720" rIns="91440" bIns="45720" rtlCol="0" anchor="b"/>
+          <a:lstStyle>
+            <a:lvl1pPr algn="r">
+              <a:defRPr sz="1200"/>
+            </a:lvl1pPr>
+          </a:lstStyle>
+          <a:p>
+            <a:fld id="{18B46FBB-F6E7-4212-B172-322218788310}" type="slidenum">
+              <a:rPr lang="ru-RU" smtClean="0"/>
+              <a:t>‹#›</a:t>
+            </a:fld>
+            <a:endParaRPr lang="ru-RU"/>
+          </a:p>
+        </p:txBody>
+      </p:sp>
+    </p:spTree>
+    <p:extLst>
+      <p:ext uri="{BB962C8B-B14F-4D97-AF65-F5344CB8AC3E}">
+        <p14:creationId xmlns:p14="http://schemas.microsoft.com/office/powerpoint/2010/main" val="4050483805"/>
+      </p:ext>
+    </p:extLst>
+  </p:cSld>
+  <p:clrMap bg1="lt1" tx1="dk1" bg2="lt2" tx2="dk2" accent1="accent1" accent2="accent2" accent3="accent3" accent4="accent4" accent5="accent5" accent6="accent6" hlink="hlink" folHlink="folHlink"/>
+  <p:notesStyle>
+    <a:lvl1pPr marL="0" algn="l" defTabSz="914400" rtl="0" eaLnBrk="1" latinLnBrk="0" hangingPunct="1">
+      <a:defRPr sz="1200" kern="1200">
+        <a:solidFill>
+          <a:schemeClr val="tx1"/>
+        </a:solidFill>
+        <a:latin typeface="+mn-lt"/>
+        <a:ea typeface="+mn-ea"/>
+        <a:cs typeface="+mn-cs"/>
+      </a:defRPr>
+    </a:lvl1pPr>
+    <a:lvl2pPr marL="457200" algn="l" defTabSz="914400" rtl="0" eaLnBrk="1" latinLnBrk="0" hangingPunct="1">
+      <a:defRPr sz="1200" kern="1200">
+        <a:solidFill>
+          <a:schemeClr val="tx1"/>
+        </a:solidFill>
+        <a:latin typeface="+mn-lt"/>
+        <a:ea typeface="+mn-ea"/>
+        <a:cs typeface="+mn-cs"/>
+      </a:defRPr>
+    </a:lvl2pPr>
+    <a:lvl3pPr marL="914400" algn="l" defTabSz="914400" rtl="0" eaLnBrk="1" latinLnBrk="0" hangingPunct="1">
+      <a:defRPr sz="1200" kern="1200">
+        <a:solidFill>
+          <a:schemeClr val="tx1"/>
+        </a:solidFill>
+        <a:latin typeface="+mn-lt"/>
+        <a:ea typeface="+mn-ea"/>
+        <a:cs typeface="+mn-cs"/>
+      </a:defRPr>
+    </a:lvl3pPr>
+    <a:lvl4pPr marL="1371600" algn="l" defTabSz="914400" rtl="0" eaLnBrk="1" latinLnBrk="0" hangingPunct="1">
+      <a:defRPr sz="1200" kern="1200">
+        <a:solidFill>
+          <a:schemeClr val="tx1"/>
+        </a:solidFill>
+        <a:latin typeface="+mn-lt"/>
+        <a:ea typeface="+mn-ea"/>
+        <a:cs typeface="+mn-cs"/>
+      </a:defRPr>
+    </a:lvl4pPr>
+    <a:lvl5pPr marL="1828800" algn="l" defTabSz="914400" rtl="0" eaLnBrk="1" latinLnBrk="0" hangingPunct="1">
+      <a:defRPr sz="1200" kern="1200">
+        <a:solidFill>
+          <a:schemeClr val="tx1"/>
+        </a:solidFill>
+        <a:latin typeface="+mn-lt"/>
+        <a:ea typeface="+mn-ea"/>
+        <a:cs typeface="+mn-cs"/>
+      </a:defRPr>
+    </a:lvl5pPr>
+    <a:lvl6pPr marL="2286000" algn="l" defTabSz="914400" rtl="0" eaLnBrk="1" latinLnBrk="0" hangingPunct="1">
+      <a:defRPr sz="1200" kern="1200">
+        <a:solidFill>
+          <a:schemeClr val="tx1"/>
+        </a:solidFill>
+        <a:latin typeface="+mn-lt"/>
+        <a:ea typeface="+mn-ea"/>
+        <a:cs typeface="+mn-cs"/>
+      </a:defRPr>
+    </a:lvl6pPr>
+    <a:lvl7pPr marL="2743200" algn="l" defTabSz="914400" rtl="0" eaLnBrk="1" latinLnBrk="0" hangingPunct="1">
+      <a:defRPr sz="1200" kern="1200">
+        <a:solidFill>
+          <a:schemeClr val="tx1"/>
+        </a:solidFill>
+        <a:latin typeface="+mn-lt"/>
+        <a:ea typeface="+mn-ea"/>
+        <a:cs typeface="+mn-cs"/>
+      </a:defRPr>
+    </a:lvl7pPr>
+    <a:lvl8pPr marL="3200400" algn="l" defTabSz="914400" rtl="0" eaLnBrk="1" latinLnBrk="0" hangingPunct="1">
+      <a:defRPr sz="1200" kern="1200">
+        <a:solidFill>
+          <a:schemeClr val="tx1"/>
+        </a:solidFill>
+        <a:latin typeface="+mn-lt"/>
+        <a:ea typeface="+mn-ea"/>
+        <a:cs typeface="+mn-cs"/>
+      </a:defRPr>
+    </a:lvl8pPr>
+    <a:lvl9pPr marL="3657600" algn="l" defTabSz="914400" rtl="0" eaLnBrk="1" latinLnBrk="0" hangingPunct="1">
+      <a:defRPr sz="1200" kern="1200">
+        <a:solidFill>
+          <a:schemeClr val="tx1"/>
+        </a:solidFill>
+        <a:latin typeface="+mn-lt"/>
+        <a:ea typeface="+mn-ea"/>
+        <a:cs typeface="+mn-cs"/>
+      </a:defRPr>
+    </a:lvl9pPr>
+  </p:notesStyle>
+</p:notesMaster>
+</file>
+
+<file path=ppt/notesSlides/notesSlide1.xml><?xml version="1.0" encoding="utf-8"?>
+<p:notes xmlns:a="http://schemas.openxmlformats.org/drawingml/2006/main" xmlns:r="http://schemas.openxmlformats.org/officeDocument/2006/relationships" xmlns:p="http://schemas.openxmlformats.org/presentationml/2006/main">
+  <p:cSld>
+    <p:spTree>
+      <p:nvGrpSpPr>
+        <p:cNvPr id="1" name=""/>
+        <p:cNvGrpSpPr/>
+        <p:nvPr/>
+      </p:nvGrpSpPr>
+      <p:grpSpPr>
+        <a:xfrm>
+          <a:off x="0" y="0"/>
+          <a:ext cx="0" cy="0"/>
+          <a:chOff x="0" y="0"/>
+          <a:chExt cx="0" cy="0"/>
+        </a:xfrm>
+      </p:grpSpPr>
+      <p:sp>
+        <p:nvSpPr>
+          <p:cNvPr id="2" name="Образ слайда 1"/>
+          <p:cNvSpPr>
+            <a:spLocks noGrp="1" noRot="1" noChangeAspect="1"/>
+          </p:cNvSpPr>
+          <p:nvPr>
+            <p:ph type="sldImg"/>
+          </p:nvPr>
+        </p:nvSpPr>
+        <p:spPr/>
+      </p:sp>
+      <p:sp>
+        <p:nvSpPr>
+          <p:cNvPr id="3" name="Заметки 2"/>
+          <p:cNvSpPr>
+            <a:spLocks noGrp="1"/>
+          </p:cNvSpPr>
+          <p:nvPr>
+            <p:ph type="body" idx="1"/>
+          </p:nvPr>
+        </p:nvSpPr>
+        <p:spPr/>
+        <p:txBody>
+          <a:bodyPr/>
+          <a:lstStyle/>
+          <a:p>
+            <a:endParaRPr lang="ru-RU"/>
+          </a:p>
+        </p:txBody>
+      </p:sp>
+      <p:sp>
+        <p:nvSpPr>
+          <p:cNvPr id="4" name="Номер слайда 3"/>
+          <p:cNvSpPr>
+            <a:spLocks noGrp="1"/>
+          </p:cNvSpPr>
+          <p:nvPr>
+            <p:ph type="sldNum" sz="quarter" idx="10"/>
+          </p:nvPr>
+        </p:nvSpPr>
+        <p:spPr/>
+        <p:txBody>
+          <a:bodyPr/>
+          <a:lstStyle/>
+          <a:p>
+            <a:fld id="{18B46FBB-F6E7-4212-B172-322218788310}" type="slidenum">
+              <a:rPr lang="ru-RU" smtClean="0"/>
+              <a:t>1</a:t>
+            </a:fld>
+            <a:endParaRPr lang="ru-RU"/>
+          </a:p>
+        </p:txBody>
+      </p:sp>
+    </p:spTree>
+    <p:extLst>
+      <p:ext uri="{BB962C8B-B14F-4D97-AF65-F5344CB8AC3E}">
+        <p14:creationId xmlns:p14="http://schemas.microsoft.com/office/powerpoint/2010/main" val="3499876496"/>
+      </p:ext>
+    </p:extLst>
+  </p:cSld>
+  <p:clrMapOvr>
+    <a:masterClrMapping/>
+  </p:clrMapOvr>
+</p:notes>
 </file>
 
 <file path=ppt/slideLayouts/slideLayout1.xml><?xml version="1.0" encoding="utf-8"?>
@@ -333,9 +782,9 @@
           <a:bodyPr/>
           <a:lstStyle/>
           <a:p>
-            <a:fld id="{66AF6DA7-116F-4B34-9C2F-EFFC78AC705C}" type="datetimeFigureOut">
-              <a:rPr lang="ru-RU" smtClean="0"/>
-              <a:t>17.04.2022</a:t>
+            <a:fld id="{73DF32B6-0D42-4DE1-AA27-F8FC6AD90F66}" type="datetime1">
+              <a:rPr lang="ru-RU" smtClean="0"/>
+              <a:t>20.04.2022</a:t>
             </a:fld>
             <a:endParaRPr lang="ru-RU"/>
           </a:p>
@@ -541,9 +990,9 @@
           <a:bodyPr/>
           <a:lstStyle/>
           <a:p>
-            <a:fld id="{66AF6DA7-116F-4B34-9C2F-EFFC78AC705C}" type="datetimeFigureOut">
-              <a:rPr lang="ru-RU" smtClean="0"/>
-              <a:t>17.04.2022</a:t>
+            <a:fld id="{99A1A0A1-1CA2-4A54-9E4B-3F9A7675767B}" type="datetime1">
+              <a:rPr lang="ru-RU" smtClean="0"/>
+              <a:t>20.04.2022</a:t>
             </a:fld>
             <a:endParaRPr lang="ru-RU"/>
           </a:p>
@@ -797,9 +1246,9 @@
           <a:bodyPr/>
           <a:lstStyle/>
           <a:p>
-            <a:fld id="{66AF6DA7-116F-4B34-9C2F-EFFC78AC705C}" type="datetimeFigureOut">
-              <a:rPr lang="ru-RU" smtClean="0"/>
-              <a:t>17.04.2022</a:t>
+            <a:fld id="{9185F245-96AD-4D26-BC2F-923AEA13F954}" type="datetime1">
+              <a:rPr lang="ru-RU" smtClean="0"/>
+              <a:t>20.04.2022</a:t>
             </a:fld>
             <a:endParaRPr lang="ru-RU"/>
           </a:p>
@@ -971,9 +1420,9 @@
           <a:bodyPr/>
           <a:lstStyle/>
           <a:p>
-            <a:fld id="{66AF6DA7-116F-4B34-9C2F-EFFC78AC705C}" type="datetimeFigureOut">
-              <a:rPr lang="ru-RU" smtClean="0"/>
-              <a:t>17.04.2022</a:t>
+            <a:fld id="{B14244AF-6FBC-4A1B-943C-16CADAD0F2E0}" type="datetime1">
+              <a:rPr lang="ru-RU" smtClean="0"/>
+              <a:t>20.04.2022</a:t>
             </a:fld>
             <a:endParaRPr lang="ru-RU"/>
           </a:p>
@@ -1314,9 +1763,9 @@
           <a:bodyPr/>
           <a:lstStyle/>
           <a:p>
-            <a:fld id="{66AF6DA7-116F-4B34-9C2F-EFFC78AC705C}" type="datetimeFigureOut">
-              <a:rPr lang="ru-RU" smtClean="0"/>
-              <a:t>17.04.2022</a:t>
+            <a:fld id="{63D12BE2-A0C3-4CDD-9668-4F1200300CDA}" type="datetime1">
+              <a:rPr lang="ru-RU" smtClean="0"/>
+              <a:t>20.04.2022</a:t>
             </a:fld>
             <a:endParaRPr lang="ru-RU"/>
           </a:p>
@@ -1589,9 +2038,9 @@
           <a:bodyPr/>
           <a:lstStyle/>
           <a:p>
-            <a:fld id="{66AF6DA7-116F-4B34-9C2F-EFFC78AC705C}" type="datetimeFigureOut">
-              <a:rPr lang="ru-RU" smtClean="0"/>
-              <a:t>17.04.2022</a:t>
+            <a:fld id="{F5555D8A-D345-4E8D-ABB6-CCA853E92888}" type="datetime1">
+              <a:rPr lang="ru-RU" smtClean="0"/>
+              <a:t>20.04.2022</a:t>
             </a:fld>
             <a:endParaRPr lang="ru-RU"/>
           </a:p>
@@ -1968,9 +2417,9 @@
           <a:bodyPr/>
           <a:lstStyle/>
           <a:p>
-            <a:fld id="{66AF6DA7-116F-4B34-9C2F-EFFC78AC705C}" type="datetimeFigureOut">
-              <a:rPr lang="ru-RU" smtClean="0"/>
-              <a:t>17.04.2022</a:t>
+            <a:fld id="{CB3D4389-ADCB-4DF3-84C8-85E48827BB04}" type="datetime1">
+              <a:rPr lang="ru-RU" smtClean="0"/>
+              <a:t>20.04.2022</a:t>
             </a:fld>
             <a:endParaRPr lang="ru-RU"/>
           </a:p>
@@ -2086,9 +2535,9 @@
           <a:bodyPr/>
           <a:lstStyle/>
           <a:p>
-            <a:fld id="{66AF6DA7-116F-4B34-9C2F-EFFC78AC705C}" type="datetimeFigureOut">
-              <a:rPr lang="ru-RU" smtClean="0"/>
-              <a:t>17.04.2022</a:t>
+            <a:fld id="{CB8119E6-46DB-4AF6-B145-9C40EA8FD682}" type="datetime1">
+              <a:rPr lang="ru-RU" smtClean="0"/>
+              <a:t>20.04.2022</a:t>
             </a:fld>
             <a:endParaRPr lang="ru-RU"/>
           </a:p>
@@ -2257,9 +2706,9 @@
           <a:bodyPr/>
           <a:lstStyle/>
           <a:p>
-            <a:fld id="{66AF6DA7-116F-4B34-9C2F-EFFC78AC705C}" type="datetimeFigureOut">
-              <a:rPr lang="ru-RU" smtClean="0"/>
-              <a:t>17.04.2022</a:t>
+            <a:fld id="{9F1B7BB2-C9A4-4347-88B6-5353D5EE1347}" type="datetime1">
+              <a:rPr lang="ru-RU" smtClean="0"/>
+              <a:t>20.04.2022</a:t>
             </a:fld>
             <a:endParaRPr lang="ru-RU"/>
           </a:p>
@@ -2611,9 +3060,9 @@
             </a:lvl1pPr>
           </a:lstStyle>
           <a:p>
-            <a:fld id="{66AF6DA7-116F-4B34-9C2F-EFFC78AC705C}" type="datetimeFigureOut">
-              <a:rPr lang="ru-RU" smtClean="0"/>
-              <a:t>17.04.2022</a:t>
+            <a:fld id="{EC451A91-1867-4987-B5D6-E10F8201DAF0}" type="datetime1">
+              <a:rPr lang="ru-RU" smtClean="0"/>
+              <a:t>20.04.2022</a:t>
             </a:fld>
             <a:endParaRPr lang="ru-RU"/>
           </a:p>
@@ -2993,9 +3442,9 @@
           <a:bodyPr/>
           <a:lstStyle/>
           <a:p>
-            <a:fld id="{66AF6DA7-116F-4B34-9C2F-EFFC78AC705C}" type="datetimeFigureOut">
-              <a:rPr lang="ru-RU" smtClean="0"/>
-              <a:t>17.04.2022</a:t>
+            <a:fld id="{7DBAF604-16D0-4473-B68F-A1355A985739}" type="datetime1">
+              <a:rPr lang="ru-RU" smtClean="0"/>
+              <a:t>20.04.2022</a:t>
             </a:fld>
             <a:endParaRPr lang="ru-RU"/>
           </a:p>
@@ -3280,9 +3729,9 @@
             </a:lvl1pPr>
           </a:lstStyle>
           <a:p>
-            <a:fld id="{66AF6DA7-116F-4B34-9C2F-EFFC78AC705C}" type="datetimeFigureOut">
-              <a:rPr lang="ru-RU" smtClean="0"/>
-              <a:t>17.04.2022</a:t>
+            <a:fld id="{70AF355E-BEFA-4E0F-804E-957FB01AE9C1}" type="datetime1">
+              <a:rPr lang="ru-RU" smtClean="0"/>
+              <a:t>20.04.2022</a:t>
             </a:fld>
             <a:endParaRPr lang="ru-RU"/>
           </a:p>
@@ -3421,6 +3870,7 @@
     <p:sldLayoutId id="2147483670" r:id="rId10"/>
     <p:sldLayoutId id="2147483671" r:id="rId11"/>
   </p:sldLayoutIdLst>
+  <p:hf hdr="0" ftr="0" dt="0"/>
   <p:txStyles>
     <p:titleStyle>
       <a:lvl1pPr algn="l" defTabSz="914400" rtl="0" eaLnBrk="1" latinLnBrk="0" hangingPunct="1">
@@ -3840,7 +4290,6 @@
               <a:rPr lang="ru-RU" dirty="0"/>
               <a:t>связанных прикладных задач</a:t>
             </a:r>
-            <a:endParaRPr lang="ru-RU" dirty="0"/>
           </a:p>
         </p:txBody>
       </p:sp>
@@ -3864,7 +4313,29 @@
               <a:rPr lang="ru-RU" dirty="0"/>
               <a:t>Работу выполнил Панюшин Д.В. 19Б12-пу</a:t>
             </a:r>
-            <a:endParaRPr lang="ru-RU" dirty="0"/>
+          </a:p>
+        </p:txBody>
+      </p:sp>
+      <p:sp>
+        <p:nvSpPr>
+          <p:cNvPr id="4" name="Номер слайда 3"/>
+          <p:cNvSpPr>
+            <a:spLocks noGrp="1"/>
+          </p:cNvSpPr>
+          <p:nvPr>
+            <p:ph type="sldNum" sz="quarter" idx="12"/>
+          </p:nvPr>
+        </p:nvSpPr>
+        <p:spPr/>
+        <p:txBody>
+          <a:bodyPr/>
+          <a:lstStyle/>
+          <a:p>
+            <a:fld id="{4C26D218-B7FE-4641-BC62-5B95ECF50343}" type="slidenum">
+              <a:rPr lang="ru-RU" smtClean="0"/>
+              <a:t>1</a:t>
+            </a:fld>
+            <a:endParaRPr lang="ru-RU"/>
           </a:p>
         </p:txBody>
       </p:sp>
@@ -3872,6 +4343,271 @@
     <p:extLst>
       <p:ext uri="{BB962C8B-B14F-4D97-AF65-F5344CB8AC3E}">
         <p14:creationId xmlns:p14="http://schemas.microsoft.com/office/powerpoint/2010/main" val="4156907315"/>
+      </p:ext>
+    </p:extLst>
+  </p:cSld>
+  <p:clrMapOvr>
+    <a:masterClrMapping/>
+  </p:clrMapOvr>
+</p:sld>
+</file>
+
+<file path=ppt/slides/slide10.xml><?xml version="1.0" encoding="utf-8"?>
+<p:sld xmlns:a="http://schemas.openxmlformats.org/drawingml/2006/main" xmlns:r="http://schemas.openxmlformats.org/officeDocument/2006/relationships" xmlns:p="http://schemas.openxmlformats.org/presentationml/2006/main">
+  <p:cSld>
+    <p:spTree>
+      <p:nvGrpSpPr>
+        <p:cNvPr id="1" name=""/>
+        <p:cNvGrpSpPr/>
+        <p:nvPr/>
+      </p:nvGrpSpPr>
+      <p:grpSpPr>
+        <a:xfrm>
+          <a:off x="0" y="0"/>
+          <a:ext cx="0" cy="0"/>
+          <a:chOff x="0" y="0"/>
+          <a:chExt cx="0" cy="0"/>
+        </a:xfrm>
+      </p:grpSpPr>
+      <p:sp>
+        <p:nvSpPr>
+          <p:cNvPr id="7" name="Заголовок 6"/>
+          <p:cNvSpPr>
+            <a:spLocks noGrp="1"/>
+          </p:cNvSpPr>
+          <p:nvPr>
+            <p:ph type="title"/>
+          </p:nvPr>
+        </p:nvSpPr>
+        <p:spPr/>
+        <p:txBody>
+          <a:bodyPr/>
+          <a:lstStyle/>
+          <a:p>
+            <a:pPr algn="ctr"/>
+            <a:r>
+              <a:rPr lang="ru-RU" dirty="0" smtClean="0"/>
+              <a:t>Данные</a:t>
+            </a:r>
+            <a:endParaRPr lang="ru-RU" dirty="0"/>
+          </a:p>
+        </p:txBody>
+      </p:sp>
+      <p:sp>
+        <p:nvSpPr>
+          <p:cNvPr id="8" name="Объект 7"/>
+          <p:cNvSpPr>
+            <a:spLocks noGrp="1"/>
+          </p:cNvSpPr>
+          <p:nvPr>
+            <p:ph idx="1"/>
+          </p:nvPr>
+        </p:nvSpPr>
+        <p:spPr>
+          <a:xfrm>
+            <a:off x="1146463" y="1845734"/>
+            <a:ext cx="10058400" cy="4023360"/>
+          </a:xfrm>
+        </p:spPr>
+        <p:txBody>
+          <a:bodyPr/>
+          <a:lstStyle/>
+          <a:p>
+            <a:pPr marL="0" indent="0">
+              <a:buNone/>
+            </a:pPr>
+            <a:r>
+              <a:rPr lang="ru-RU" dirty="0" smtClean="0"/>
+              <a:t>	Для анализа работы алгоритмов использованы три социальных графа:</a:t>
+            </a:r>
+          </a:p>
+          <a:p>
+            <a:pPr lvl="1">
+              <a:buFont typeface="Arial" panose="020B0604020202020204" pitchFamily="34" charset="0"/>
+              <a:buChar char="•"/>
+            </a:pPr>
+            <a:r>
+              <a:rPr lang="ru-RU" sz="2000" b="1" dirty="0" smtClean="0"/>
+              <a:t>CA-</a:t>
+            </a:r>
+            <a:r>
+              <a:rPr lang="ru-RU" sz="2000" b="1" dirty="0" err="1" smtClean="0"/>
+              <a:t>AstroPh</a:t>
+            </a:r>
+            <a:r>
+              <a:rPr lang="ru-RU" sz="2000" dirty="0" smtClean="0"/>
+              <a:t>: </a:t>
+            </a:r>
+            <a:r>
+              <a:rPr lang="ru-RU" sz="2000" dirty="0"/>
+              <a:t>неориентированный </a:t>
+            </a:r>
+            <a:r>
+              <a:rPr lang="ru-RU" sz="2000" dirty="0" smtClean="0"/>
+              <a:t>граф соавторства в области астрофизики (вершины – авторы статей</a:t>
+            </a:r>
+            <a:r>
+              <a:rPr lang="ru-RU" sz="2000" dirty="0"/>
+              <a:t>, </a:t>
+            </a:r>
+            <a:r>
+              <a:rPr lang="ru-RU" sz="2000" dirty="0" smtClean="0"/>
+              <a:t>рёбра–между соавторами одной статьи);</a:t>
+            </a:r>
+          </a:p>
+          <a:p>
+            <a:pPr lvl="1">
+              <a:buFont typeface="Arial" panose="020B0604020202020204" pitchFamily="34" charset="0"/>
+              <a:buChar char="•"/>
+            </a:pPr>
+            <a:r>
+              <a:rPr lang="ru-RU" sz="2000" b="1" dirty="0" err="1" smtClean="0"/>
+              <a:t>Web-Google</a:t>
+            </a:r>
+            <a:r>
+              <a:rPr lang="ru-RU" sz="2000" dirty="0"/>
+              <a:t>: </a:t>
+            </a:r>
+            <a:r>
+              <a:rPr lang="ru-RU" sz="2000" dirty="0" smtClean="0"/>
+              <a:t>ориентированный граф, вершины которого </a:t>
+            </a:r>
+            <a:r>
+              <a:rPr lang="en-US" sz="2000" dirty="0" smtClean="0"/>
+              <a:t>w</a:t>
+            </a:r>
+            <a:r>
+              <a:rPr lang="ru-RU" sz="2000" dirty="0" err="1" smtClean="0"/>
+              <a:t>eb</a:t>
+            </a:r>
+            <a:r>
+              <a:rPr lang="ru-RU" sz="2000" dirty="0" smtClean="0"/>
+              <a:t>-страницы,</a:t>
+            </a:r>
+            <a:r>
+              <a:rPr lang="en-US" sz="2000" dirty="0" smtClean="0"/>
+              <a:t> a</a:t>
+            </a:r>
+            <a:r>
+              <a:rPr lang="ru-RU" sz="2000" dirty="0" smtClean="0"/>
+              <a:t> </a:t>
+            </a:r>
+            <a:r>
+              <a:rPr lang="ru-RU" sz="2000" dirty="0"/>
+              <a:t>рёбра </a:t>
+            </a:r>
+            <a:r>
+              <a:rPr lang="ru-RU" sz="2000" dirty="0" smtClean="0"/>
+              <a:t>–</a:t>
+            </a:r>
+            <a:r>
+              <a:rPr lang="en-US" sz="2000" dirty="0" smtClean="0"/>
+              <a:t> </a:t>
+            </a:r>
+            <a:r>
+              <a:rPr lang="ru-RU" sz="2000" dirty="0" smtClean="0"/>
+              <a:t>ссылки между ними;</a:t>
+            </a:r>
+          </a:p>
+          <a:p>
+            <a:pPr lvl="1">
+              <a:buFont typeface="Arial" panose="020B0604020202020204" pitchFamily="34" charset="0"/>
+              <a:buChar char="•"/>
+            </a:pPr>
+            <a:r>
+              <a:rPr lang="en-US" sz="2000" b="1" dirty="0" smtClean="0"/>
+              <a:t>V</a:t>
+            </a:r>
+            <a:r>
+              <a:rPr lang="ru-RU" sz="2000" b="1" dirty="0" smtClean="0"/>
+              <a:t>k</a:t>
+            </a:r>
+            <a:r>
+              <a:rPr lang="ru-RU" sz="2000" dirty="0"/>
+              <a:t>:</a:t>
+            </a:r>
+            <a:r>
+              <a:rPr lang="ru-RU" sz="2000" dirty="0" smtClean="0"/>
+              <a:t> неориентированный </a:t>
+            </a:r>
+            <a:r>
+              <a:rPr lang="ru-RU" sz="2000" dirty="0"/>
+              <a:t>взвешенный граф</a:t>
+            </a:r>
+            <a:r>
+              <a:rPr lang="ru-RU" sz="2000" dirty="0" smtClean="0"/>
+              <a:t> пользователей </a:t>
+            </a:r>
+            <a:r>
+              <a:rPr lang="ru-RU" sz="2000" dirty="0" err="1" smtClean="0"/>
+              <a:t>вконтакте</a:t>
+            </a:r>
+            <a:r>
+              <a:rPr lang="ru-RU" sz="2000" dirty="0" smtClean="0"/>
+              <a:t>.</a:t>
+            </a:r>
+          </a:p>
+          <a:p>
+            <a:pPr marL="201168" lvl="1" indent="0">
+              <a:buNone/>
+            </a:pPr>
+            <a:r>
+              <a:rPr lang="ru-RU" sz="2000" dirty="0" smtClean="0"/>
+              <a:t>	В процессе исследования граф преобразуется в словарь - встроенный формат языка </a:t>
+            </a:r>
+            <a:r>
+              <a:rPr lang="en-US" sz="2000" dirty="0" smtClean="0"/>
+              <a:t>Python (</a:t>
+            </a:r>
+            <a:r>
+              <a:rPr lang="ru-RU" sz="2000" dirty="0" smtClean="0"/>
+              <a:t>который использовался для анализа).</a:t>
+            </a:r>
+            <a:r>
+              <a:rPr lang="en-US" sz="2000" dirty="0"/>
+              <a:t> </a:t>
+            </a:r>
+            <a:r>
+              <a:rPr lang="ru-RU" sz="2000" dirty="0" smtClean="0"/>
+              <a:t>Данный словарь хранит информацию как о структуре самого графа, так и мета-информацию, например различные метки и расстояния до ориентиров).</a:t>
+            </a:r>
+            <a:endParaRPr lang="ru-RU" sz="2000" dirty="0"/>
+          </a:p>
+          <a:p>
+            <a:pPr marL="201168" lvl="1" indent="0">
+              <a:buNone/>
+            </a:pPr>
+            <a:endParaRPr lang="ru-RU" sz="2000" dirty="0" smtClean="0"/>
+          </a:p>
+        </p:txBody>
+      </p:sp>
+      <p:sp>
+        <p:nvSpPr>
+          <p:cNvPr id="9" name="Номер слайда 8"/>
+          <p:cNvSpPr>
+            <a:spLocks noGrp="1"/>
+          </p:cNvSpPr>
+          <p:nvPr>
+            <p:ph type="sldNum" sz="quarter" idx="12"/>
+          </p:nvPr>
+        </p:nvSpPr>
+        <p:spPr/>
+        <p:txBody>
+          <a:bodyPr/>
+          <a:lstStyle/>
+          <a:p>
+            <a:fld id="{4C26D218-B7FE-4641-BC62-5B95ECF50343}" type="slidenum">
+              <a:rPr lang="ru-RU" smtClean="0"/>
+              <a:t>10</a:t>
+            </a:fld>
+            <a:endParaRPr lang="ru-RU"/>
+          </a:p>
+        </p:txBody>
+      </p:sp>
+    </p:spTree>
+    <p:extLst>
+      <p:ext uri="{BB962C8B-B14F-4D97-AF65-F5344CB8AC3E}">
+        <p14:creationId xmlns:p14="http://schemas.microsoft.com/office/powerpoint/2010/main" val="3262628539"/>
       </p:ext>
     </p:extLst>
   </p:cSld>
@@ -3947,9 +4683,12 @@
           <a:bodyPr/>
           <a:lstStyle/>
           <a:p>
-            <a:r>
-              <a:rPr lang="ru-RU" dirty="0"/>
-              <a:t>Вычисление </a:t>
+            <a:pPr marL="0" indent="0">
+              <a:buNone/>
+            </a:pPr>
+            <a:r>
+              <a:rPr lang="ru-RU" dirty="0" smtClean="0"/>
+              <a:t>	Вычисление </a:t>
             </a:r>
             <a:r>
               <a:rPr lang="ru-RU" dirty="0" smtClean="0"/>
@@ -3983,7 +4722,6 @@
               <a:rPr lang="ru-RU" dirty="0"/>
               <a:t>, из-за размера таких сетей точное вычисление расстояний зачастую невозможно, и возникает необходимость в приближенных алгоритмах.</a:t>
             </a:r>
-            <a:endParaRPr lang="ru-RU" dirty="0"/>
           </a:p>
         </p:txBody>
       </p:sp>
@@ -4036,9 +4774,16 @@
           <a:bodyPr/>
           <a:lstStyle/>
           <a:p>
+            <a:pPr marL="0" indent="0">
+              <a:buNone/>
+            </a:pPr>
             <a:r>
               <a:rPr lang="ru-RU" dirty="0" smtClean="0"/>
-              <a:t>Исследована работа </a:t>
+              <a:t>	Исследована </a:t>
+            </a:r>
+            <a:r>
+              <a:rPr lang="ru-RU" dirty="0" smtClean="0"/>
+              <a:t>работа </a:t>
             </a:r>
             <a:r>
               <a:rPr lang="ru-RU" dirty="0"/>
@@ -4073,6 +4818,29 @@
               <a:t>вершин-ориентиров.</a:t>
             </a:r>
             <a:endParaRPr lang="ru-RU" dirty="0"/>
+          </a:p>
+        </p:txBody>
+      </p:sp>
+      <p:sp>
+        <p:nvSpPr>
+          <p:cNvPr id="2" name="Номер слайда 1"/>
+          <p:cNvSpPr>
+            <a:spLocks noGrp="1"/>
+          </p:cNvSpPr>
+          <p:nvPr>
+            <p:ph type="sldNum" sz="quarter" idx="12"/>
+          </p:nvPr>
+        </p:nvSpPr>
+        <p:spPr/>
+        <p:txBody>
+          <a:bodyPr/>
+          <a:lstStyle/>
+          <a:p>
+            <a:fld id="{4C26D218-B7FE-4641-BC62-5B95ECF50343}" type="slidenum">
+              <a:rPr lang="ru-RU" smtClean="0"/>
+              <a:t>2</a:t>
+            </a:fld>
+            <a:endParaRPr lang="ru-RU"/>
           </a:p>
         </p:txBody>
       </p:sp>
@@ -4140,15 +4908,28 @@
             <p:ph idx="1"/>
           </p:nvPr>
         </p:nvSpPr>
-        <p:spPr/>
-        <p:txBody>
-          <a:bodyPr/>
-          <a:lstStyle/>
-          <a:p>
-            <a:pPr algn="just"/>
+        <p:spPr>
+          <a:xfrm>
+            <a:off x="1097280" y="1845734"/>
+            <a:ext cx="4960619" cy="4023360"/>
+          </a:xfrm>
+        </p:spPr>
+        <p:txBody>
+          <a:bodyPr>
+            <a:normAutofit lnSpcReduction="10000"/>
+          </a:bodyPr>
+          <a:lstStyle/>
+          <a:p>
+            <a:pPr marL="0" indent="0" algn="just">
+              <a:buNone/>
+            </a:pPr>
             <a:r>
               <a:rPr lang="ru-RU" dirty="0" smtClean="0"/>
-              <a:t>В представленной работе сравнивается работа двух алгоритмов для вычисления расстояний между вершинами сети: стандартный обход в ширину (</a:t>
+              <a:t>	В </a:t>
+            </a:r>
+            <a:r>
+              <a:rPr lang="ru-RU" dirty="0" smtClean="0"/>
+              <a:t>представленной работе сравнивается работа двух алгоритмов для вычисления расстояний между вершинами сети: стандартный обход в ширину (</a:t>
             </a:r>
             <a:r>
               <a:rPr lang="en-US" dirty="0"/>
@@ -4181,34 +4962,2177 @@
             <a:endParaRPr lang="en-US" dirty="0"/>
           </a:p>
           <a:p>
-            <a:pPr algn="just"/>
+            <a:pPr marL="0" indent="0" algn="just">
+              <a:buNone/>
+            </a:pPr>
             <a:r>
               <a:rPr lang="ru-RU" dirty="0" smtClean="0"/>
-              <a:t>При определении вершин-ориентиров использованы три стратегии: случайный выбор ориентиров, выбор вершин с наибольшими степенями и выбор вершин с наименьшими коэффициентами центральности.</a:t>
-            </a:r>
-          </a:p>
-          <a:p>
-            <a:pPr algn="just"/>
+              <a:t>	При </a:t>
+            </a:r>
             <a:r>
               <a:rPr lang="ru-RU" dirty="0" smtClean="0"/>
-              <a:t>Так как вычисление </a:t>
-            </a:r>
-            <a:r>
-              <a:rPr lang="ru-RU" smtClean="0"/>
-              <a:t>коэффициентов центральности </a:t>
+              <a:t>определении вершин-ориентиров использованы три стратегии: случайный выбор ориентиров, выбор вершин с наибольшими степенями и выбор вершин с наименьшими коэффициентами </a:t>
+            </a:r>
+            <a:r>
+              <a:rPr lang="ru-RU" dirty="0" smtClean="0"/>
+              <a:t>центральности.</a:t>
+            </a:r>
+          </a:p>
+          <a:p>
+            <a:pPr marL="0" indent="0" algn="just">
+              <a:buNone/>
+            </a:pPr>
+            <a:r>
+              <a:rPr lang="ru-RU" dirty="0" smtClean="0"/>
+              <a:t>	</a:t>
             </a:r>
             <a:endParaRPr lang="ru-RU" dirty="0" smtClean="0"/>
           </a:p>
-          <a:p>
-            <a:pPr algn="just"/>
-            <a:endParaRPr lang="ru-RU" dirty="0" smtClean="0"/>
-          </a:p>
-        </p:txBody>
-      </p:sp>
+        </p:txBody>
+      </p:sp>
+      <p:sp>
+        <p:nvSpPr>
+          <p:cNvPr id="4" name="Номер слайда 3"/>
+          <p:cNvSpPr>
+            <a:spLocks noGrp="1"/>
+          </p:cNvSpPr>
+          <p:nvPr>
+            <p:ph type="sldNum" sz="quarter" idx="12"/>
+          </p:nvPr>
+        </p:nvSpPr>
+        <p:spPr/>
+        <p:txBody>
+          <a:bodyPr/>
+          <a:lstStyle/>
+          <a:p>
+            <a:fld id="{4C26D218-B7FE-4641-BC62-5B95ECF50343}" type="slidenum">
+              <a:rPr lang="ru-RU" smtClean="0"/>
+              <a:t>3</a:t>
+            </a:fld>
+            <a:endParaRPr lang="ru-RU"/>
+          </a:p>
+        </p:txBody>
+      </p:sp>
+      <p:pic>
+        <p:nvPicPr>
+          <p:cNvPr id="2054" name="Picture 6" descr="https://2.bp.blogspot.com/-1rtTcIVD2c4/W4gDI5EDXOI/AAAAAAAACvY/-JAD-eNklz8dM3vWn9dMzBBiywUcfug8gCLcBGAs/s1600/ojqZYw7l.png"/>
+          <p:cNvPicPr>
+            <a:picLocks noChangeAspect="1" noChangeArrowheads="1"/>
+          </p:cNvPicPr>
+          <p:nvPr/>
+        </p:nvPicPr>
+        <p:blipFill>
+          <a:blip r:embed="rId2" cstate="print">
+            <a:extLst>
+              <a:ext uri="{28A0092B-C50C-407E-A947-70E740481C1C}">
+                <a14:useLocalDpi xmlns:a14="http://schemas.microsoft.com/office/drawing/2010/main" val="0"/>
+              </a:ext>
+            </a:extLst>
+          </a:blip>
+          <a:srcRect/>
+          <a:stretch>
+            <a:fillRect/>
+          </a:stretch>
+        </p:blipFill>
+        <p:spPr bwMode="auto">
+          <a:xfrm>
+            <a:off x="6591771" y="2058948"/>
+            <a:ext cx="4563909" cy="3596931"/>
+          </a:xfrm>
+          <a:prstGeom prst="rect">
+            <a:avLst/>
+          </a:prstGeom>
+          <a:noFill/>
+          <a:extLst>
+            <a:ext uri="{909E8E84-426E-40DD-AFC4-6F175D3DCCD1}">
+              <a14:hiddenFill xmlns:a14="http://schemas.microsoft.com/office/drawing/2010/main">
+                <a:solidFill>
+                  <a:srgbClr val="FFFFFF"/>
+                </a:solidFill>
+              </a14:hiddenFill>
+            </a:ext>
+          </a:extLst>
+        </p:spPr>
+      </p:pic>
     </p:spTree>
     <p:extLst>
       <p:ext uri="{BB962C8B-B14F-4D97-AF65-F5344CB8AC3E}">
         <p14:creationId xmlns:p14="http://schemas.microsoft.com/office/powerpoint/2010/main" val="1066824844"/>
+      </p:ext>
+    </p:extLst>
+  </p:cSld>
+  <p:clrMapOvr>
+    <a:masterClrMapping/>
+  </p:clrMapOvr>
+</p:sld>
+</file>
+
+<file path=ppt/slides/slide4.xml><?xml version="1.0" encoding="utf-8"?>
+<p:sld xmlns:a="http://schemas.openxmlformats.org/drawingml/2006/main" xmlns:r="http://schemas.openxmlformats.org/officeDocument/2006/relationships" xmlns:p="http://schemas.openxmlformats.org/presentationml/2006/main">
+  <p:cSld>
+    <p:spTree>
+      <p:nvGrpSpPr>
+        <p:cNvPr id="1" name=""/>
+        <p:cNvGrpSpPr/>
+        <p:nvPr/>
+      </p:nvGrpSpPr>
+      <p:grpSpPr>
+        <a:xfrm>
+          <a:off x="0" y="0"/>
+          <a:ext cx="0" cy="0"/>
+          <a:chOff x="0" y="0"/>
+          <a:chExt cx="0" cy="0"/>
+        </a:xfrm>
+      </p:grpSpPr>
+      <p:sp>
+        <p:nvSpPr>
+          <p:cNvPr id="2" name="Заголовок 1"/>
+          <p:cNvSpPr>
+            <a:spLocks noGrp="1"/>
+          </p:cNvSpPr>
+          <p:nvPr>
+            <p:ph type="title"/>
+          </p:nvPr>
+        </p:nvSpPr>
+        <p:spPr/>
+        <p:txBody>
+          <a:bodyPr/>
+          <a:lstStyle/>
+          <a:p>
+            <a:pPr algn="ctr"/>
+            <a:r>
+              <a:rPr lang="en-US" dirty="0"/>
+              <a:t>Breath-First </a:t>
+            </a:r>
+            <a:r>
+              <a:rPr lang="en-US" dirty="0" smtClean="0"/>
+              <a:t>Search</a:t>
+            </a:r>
+            <a:endParaRPr lang="ru-RU" dirty="0"/>
+          </a:p>
+        </p:txBody>
+      </p:sp>
+      <p:sp>
+        <p:nvSpPr>
+          <p:cNvPr id="3" name="Объект 2"/>
+          <p:cNvSpPr>
+            <a:spLocks noGrp="1"/>
+          </p:cNvSpPr>
+          <p:nvPr>
+            <p:ph sz="half" idx="1"/>
+          </p:nvPr>
+        </p:nvSpPr>
+        <p:spPr>
+          <a:xfrm>
+            <a:off x="1097278" y="1845734"/>
+            <a:ext cx="5918983" cy="4023360"/>
+          </a:xfrm>
+        </p:spPr>
+        <p:txBody>
+          <a:bodyPr/>
+          <a:lstStyle/>
+          <a:p>
+            <a:pPr marL="0" indent="0">
+              <a:buNone/>
+            </a:pPr>
+            <a:r>
+              <a:rPr lang="ru-RU" dirty="0" smtClean="0"/>
+              <a:t>	Пусть задан граф </a:t>
+            </a:r>
+            <a:r>
+              <a:rPr lang="en-US" dirty="0" smtClean="0"/>
+              <a:t>G(V, E) </a:t>
+            </a:r>
+            <a:r>
+              <a:rPr lang="ru-RU" dirty="0" smtClean="0"/>
+              <a:t>и указана изначальная вершина </a:t>
+            </a:r>
+            <a:r>
+              <a:rPr lang="en-US" dirty="0" smtClean="0"/>
+              <a:t>s.</a:t>
+            </a:r>
+            <a:r>
+              <a:rPr lang="ru-RU" dirty="0" smtClean="0"/>
+              <a:t> Алгоритм обходит все рёбра графа для поиска  вершин, достижимых из </a:t>
+            </a:r>
+            <a:r>
+              <a:rPr lang="en-US" dirty="0" smtClean="0"/>
+              <a:t>s.</a:t>
+            </a:r>
+            <a:r>
+              <a:rPr lang="ru-RU" dirty="0" smtClean="0"/>
+              <a:t> Обходом в ширину он называется так как перед тем как приступить к поиску вершин  на расстоянии </a:t>
+            </a:r>
+            <a:r>
+              <a:rPr lang="en-US" dirty="0" smtClean="0"/>
+              <a:t>k+1</a:t>
+            </a:r>
+            <a:r>
+              <a:rPr lang="ru-RU" dirty="0" smtClean="0"/>
+              <a:t>, выполняется обход всех вершин на расстоянии </a:t>
+            </a:r>
+            <a:r>
+              <a:rPr lang="en-US" dirty="0" smtClean="0"/>
+              <a:t>k.</a:t>
+            </a:r>
+            <a:endParaRPr lang="ru-RU" dirty="0"/>
+          </a:p>
+          <a:p>
+            <a:pPr marL="0" indent="0">
+              <a:buNone/>
+            </a:pPr>
+            <a:r>
+              <a:rPr lang="ru-RU" dirty="0" smtClean="0"/>
+              <a:t>	В проделанной работе данный алгоритм реализован с использованием двух очередей: сначала не обойдённые вершины добавляются в одну из них, а затем извлекаются из неё, а следующие не обойдённые вершины добавляются в другую очередь. Когда каждая из них опустошается счётчик расстояния увеличивается на единицу.</a:t>
+            </a:r>
+            <a:endParaRPr lang="en-US" dirty="0" smtClean="0"/>
+          </a:p>
+        </p:txBody>
+      </p:sp>
+      <p:pic>
+        <p:nvPicPr>
+          <p:cNvPr id="6" name="Объект 5"/>
+          <p:cNvPicPr>
+            <a:picLocks noGrp="1" noChangeAspect="1"/>
+          </p:cNvPicPr>
+          <p:nvPr>
+            <p:ph sz="half" idx="2"/>
+          </p:nvPr>
+        </p:nvPicPr>
+        <p:blipFill>
+          <a:blip r:embed="rId2">
+            <a:extLst>
+              <a:ext uri="{28A0092B-C50C-407E-A947-70E740481C1C}">
+                <a14:useLocalDpi xmlns:a14="http://schemas.microsoft.com/office/drawing/2010/main" val="0"/>
+              </a:ext>
+            </a:extLst>
+          </a:blip>
+          <a:stretch>
+            <a:fillRect/>
+          </a:stretch>
+        </p:blipFill>
+        <p:spPr>
+          <a:xfrm>
+            <a:off x="7396407" y="1846369"/>
+            <a:ext cx="4022725" cy="4022725"/>
+          </a:xfrm>
+        </p:spPr>
+      </p:pic>
+      <p:sp>
+        <p:nvSpPr>
+          <p:cNvPr id="28" name="Номер слайда 27"/>
+          <p:cNvSpPr>
+            <a:spLocks noGrp="1"/>
+          </p:cNvSpPr>
+          <p:nvPr>
+            <p:ph type="sldNum" sz="quarter" idx="12"/>
+          </p:nvPr>
+        </p:nvSpPr>
+        <p:spPr/>
+        <p:txBody>
+          <a:bodyPr/>
+          <a:lstStyle/>
+          <a:p>
+            <a:fld id="{4C26D218-B7FE-4641-BC62-5B95ECF50343}" type="slidenum">
+              <a:rPr lang="ru-RU" smtClean="0"/>
+              <a:t>4</a:t>
+            </a:fld>
+            <a:endParaRPr lang="ru-RU"/>
+          </a:p>
+        </p:txBody>
+      </p:sp>
+    </p:spTree>
+    <p:extLst>
+      <p:ext uri="{BB962C8B-B14F-4D97-AF65-F5344CB8AC3E}">
+        <p14:creationId xmlns:p14="http://schemas.microsoft.com/office/powerpoint/2010/main" val="2840380458"/>
+      </p:ext>
+    </p:extLst>
+  </p:cSld>
+  <p:clrMapOvr>
+    <a:masterClrMapping/>
+  </p:clrMapOvr>
+  <p:timing>
+    <p:tnLst>
+      <p:par>
+        <p:cTn id="1" dur="indefinite" restart="never" nodeType="tmRoot"/>
+      </p:par>
+    </p:tnLst>
+  </p:timing>
+</p:sld>
+</file>
+
+<file path=ppt/slides/slide5.xml><?xml version="1.0" encoding="utf-8"?>
+<p:sld xmlns:a="http://schemas.openxmlformats.org/drawingml/2006/main" xmlns:r="http://schemas.openxmlformats.org/officeDocument/2006/relationships" xmlns:p="http://schemas.openxmlformats.org/presentationml/2006/main">
+  <p:cSld>
+    <p:spTree>
+      <p:nvGrpSpPr>
+        <p:cNvPr id="1" name=""/>
+        <p:cNvGrpSpPr/>
+        <p:nvPr/>
+      </p:nvGrpSpPr>
+      <p:grpSpPr>
+        <a:xfrm>
+          <a:off x="0" y="0"/>
+          <a:ext cx="0" cy="0"/>
+          <a:chOff x="0" y="0"/>
+          <a:chExt cx="0" cy="0"/>
+        </a:xfrm>
+      </p:grpSpPr>
+      <p:sp>
+        <p:nvSpPr>
+          <p:cNvPr id="2" name="Заголовок 1"/>
+          <p:cNvSpPr>
+            <a:spLocks noGrp="1"/>
+          </p:cNvSpPr>
+          <p:nvPr>
+            <p:ph type="title"/>
+          </p:nvPr>
+        </p:nvSpPr>
+        <p:spPr/>
+        <p:txBody>
+          <a:bodyPr/>
+          <a:lstStyle/>
+          <a:p>
+            <a:pPr algn="ctr"/>
+            <a:r>
+              <a:rPr lang="ru-RU" dirty="0" smtClean="0"/>
+              <a:t>Использование </a:t>
+            </a:r>
+            <a:r>
+              <a:rPr lang="en-US" dirty="0" smtClean="0"/>
+              <a:t>Landmarks-BFS</a:t>
+            </a:r>
+            <a:endParaRPr lang="ru-RU" dirty="0"/>
+          </a:p>
+        </p:txBody>
+      </p:sp>
+      <mc:AlternateContent xmlns:mc="http://schemas.openxmlformats.org/markup-compatibility/2006">
+        <mc:Choice xmlns:a14="http://schemas.microsoft.com/office/drawing/2010/main" Requires="a14">
+          <p:sp>
+            <p:nvSpPr>
+              <p:cNvPr id="3" name="Объект 2"/>
+              <p:cNvSpPr>
+                <a:spLocks noGrp="1"/>
+              </p:cNvSpPr>
+              <p:nvPr>
+                <p:ph idx="1"/>
+              </p:nvPr>
+            </p:nvSpPr>
+            <p:spPr>
+              <a:xfrm>
+                <a:off x="241300" y="1845734"/>
+                <a:ext cx="11811000" cy="4428066"/>
+              </a:xfrm>
+            </p:spPr>
+            <p:txBody>
+              <a:bodyPr>
+                <a:noAutofit/>
+              </a:bodyPr>
+              <a:lstStyle/>
+              <a:p>
+                <a:pPr marL="0" indent="0" algn="just">
+                  <a:buNone/>
+                </a:pPr>
+                <a:r>
+                  <a:rPr lang="ru-RU" dirty="0" smtClean="0"/>
+                  <a:t> 	Пусть дан граф, состоящий из </a:t>
+                </a:r>
+                <a:r>
+                  <a:rPr lang="en-US" i="1" dirty="0"/>
+                  <a:t>n</a:t>
+                </a:r>
+                <a:r>
+                  <a:rPr lang="en-US" dirty="0" smtClean="0"/>
+                  <a:t> </a:t>
+                </a:r>
+                <a:r>
+                  <a:rPr lang="ru-RU" dirty="0" smtClean="0"/>
+                  <a:t>вершин, </a:t>
+                </a:r>
+                <a:r>
+                  <a:rPr lang="en-US" i="1" dirty="0" smtClean="0"/>
+                  <a:t>m</a:t>
+                </a:r>
+                <a:r>
+                  <a:rPr lang="ru-RU" i="1" dirty="0" smtClean="0"/>
+                  <a:t> </a:t>
+                </a:r>
+                <a:r>
+                  <a:rPr lang="ru-RU" dirty="0" smtClean="0"/>
+                  <a:t>граней, множества из </a:t>
+                </a:r>
+                <a:r>
+                  <a:rPr lang="en-US" i="1" dirty="0" smtClean="0"/>
+                  <a:t>d</a:t>
+                </a:r>
+                <a:r>
+                  <a:rPr lang="en-US" dirty="0" smtClean="0"/>
+                  <a:t> </a:t>
+                </a:r>
+                <a:r>
+                  <a:rPr lang="ru-RU" dirty="0" smtClean="0"/>
+                  <a:t>вершин-ориентиров и заранее вычисленных расстояний от каждой вершины до каждого ориентира (если существует соответствующий путь).</a:t>
+                </a:r>
+                <a:r>
+                  <a:rPr lang="ru-RU" dirty="0"/>
+                  <a:t> </a:t>
+                </a:r>
+                <a:r>
+                  <a:rPr lang="ru-RU" dirty="0" smtClean="0"/>
+                  <a:t>Стоимость</a:t>
+                </a:r>
+                <a:r>
+                  <a:rPr lang="en-US" i="1" dirty="0"/>
+                  <a:t> </a:t>
+                </a:r>
+                <a:r>
+                  <a:rPr lang="en-US" i="1" dirty="0" smtClean="0"/>
+                  <a:t>d</a:t>
+                </a:r>
+                <a:r>
+                  <a:rPr lang="ru-RU" dirty="0"/>
+                  <a:t> </a:t>
+                </a:r>
+                <a:r>
+                  <a:rPr lang="ru-RU" dirty="0" smtClean="0"/>
+                  <a:t>запусков </a:t>
+                </a:r>
+                <a:r>
+                  <a:rPr lang="en-US" dirty="0" smtClean="0"/>
+                  <a:t>BFS</a:t>
+                </a:r>
+                <a:r>
+                  <a:rPr lang="ru-RU" dirty="0" smtClean="0"/>
+                  <a:t> из вершин-ориентиров - </a:t>
+                </a:r>
+                <a:r>
+                  <a:rPr lang="en-US" i="1" dirty="0"/>
+                  <a:t>O(md</a:t>
+                </a:r>
+                <a:r>
+                  <a:rPr lang="en-US" i="1" dirty="0" smtClean="0"/>
+                  <a:t>).</a:t>
+                </a:r>
+              </a:p>
+              <a:p>
+                <a:pPr marL="0" indent="0" algn="just">
+                  <a:buNone/>
+                </a:pPr>
+                <a:r>
+                  <a:rPr lang="ru-RU" dirty="0" smtClean="0"/>
+                  <a:t>Ис</a:t>
+                </a:r>
+                <a:r>
+                  <a:rPr lang="ru-RU" dirty="0"/>
+                  <a:t>п</a:t>
+                </a:r>
+                <a:r>
+                  <a:rPr lang="ru-RU" dirty="0" smtClean="0"/>
+                  <a:t>ользуя ориентиры можно оценить расстояния между двумя любыми вершинами (принадлежащими одной компоненте связности) следующим образом:</a:t>
+                </a:r>
+              </a:p>
+              <a:p>
+                <a:pPr marL="0" indent="0" algn="just">
+                  <a:buNone/>
+                </a:pPr>
+                <a14:m>
+                  <m:oMathPara xmlns:m="http://schemas.openxmlformats.org/officeDocument/2006/math">
+                    <m:oMathParaPr>
+                      <m:jc m:val="centerGroup"/>
+                    </m:oMathParaPr>
+                    <m:oMath xmlns:m="http://schemas.openxmlformats.org/officeDocument/2006/math">
+                      <m:r>
+                        <a:rPr lang="en-US" b="0" i="1" smtClean="0"/>
+                        <m:t>𝐿</m:t>
+                      </m:r>
+                      <m:r>
+                        <a:rPr lang="en-US" b="0" i="1" smtClean="0"/>
+                        <m:t>=</m:t>
+                      </m:r>
+                      <m:func>
+                        <m:funcPr>
+                          <m:ctrlPr>
+                            <a:rPr lang="en-US" i="1" smtClean="0"/>
+                          </m:ctrlPr>
+                        </m:funcPr>
+                        <m:fName>
+                          <m:limLow>
+                            <m:limLowPr>
+                              <m:ctrlPr>
+                                <a:rPr lang="en-US" i="1" smtClean="0"/>
+                              </m:ctrlPr>
+                            </m:limLowPr>
+                            <m:e>
+                              <m:r>
+                                <m:rPr>
+                                  <m:sty m:val="p"/>
+                                </m:rPr>
+                                <a:rPr lang="en-US" i="0" smtClean="0"/>
+                                <m:t>max</m:t>
+                              </m:r>
+                            </m:e>
+                            <m:lim>
+                              <m:r>
+                                <a:rPr lang="en-US" b="0" i="1" smtClean="0"/>
+                                <m:t>𝑖</m:t>
+                              </m:r>
+                            </m:lim>
+                          </m:limLow>
+                        </m:fName>
+                        <m:e>
+                          <m:r>
+                            <a:rPr lang="en-US" b="0" i="1" smtClean="0"/>
+                            <m:t>|</m:t>
+                          </m:r>
+                          <m:sSub>
+                            <m:sSubPr>
+                              <m:ctrlPr>
+                                <a:rPr lang="en-US" b="0" i="1" smtClean="0"/>
+                              </m:ctrlPr>
+                            </m:sSubPr>
+                            <m:e>
+                              <m:r>
+                                <a:rPr lang="en-US" b="0" i="1" smtClean="0"/>
+                                <m:t>𝑠</m:t>
+                              </m:r>
+                            </m:e>
+                            <m:sub>
+                              <m:r>
+                                <a:rPr lang="en-US" b="0" i="1" smtClean="0"/>
+                                <m:t>𝑖</m:t>
+                              </m:r>
+                            </m:sub>
+                          </m:sSub>
+                          <m:r>
+                            <a:rPr lang="en-US" b="0" i="1" smtClean="0"/>
+                            <m:t>−</m:t>
+                          </m:r>
+                          <m:sSub>
+                            <m:sSubPr>
+                              <m:ctrlPr>
+                                <a:rPr lang="en-US" b="0" i="1" smtClean="0"/>
+                              </m:ctrlPr>
+                            </m:sSubPr>
+                            <m:e>
+                              <m:r>
+                                <a:rPr lang="en-US" b="0" i="1" smtClean="0"/>
+                                <m:t>𝑡</m:t>
+                              </m:r>
+                            </m:e>
+                            <m:sub>
+                              <m:r>
+                                <a:rPr lang="en-US" b="0" i="1" smtClean="0"/>
+                                <m:t>𝑖</m:t>
+                              </m:r>
+                            </m:sub>
+                          </m:sSub>
+                          <m:r>
+                            <a:rPr lang="en-US" b="0" i="1" smtClean="0"/>
+                            <m:t>|</m:t>
+                          </m:r>
+                        </m:e>
+                      </m:func>
+                      <m:r>
+                        <a:rPr lang="en-US" b="0" i="1" smtClean="0"/>
+                        <m:t>≤</m:t>
+                      </m:r>
+                      <m:sSub>
+                        <m:sSubPr>
+                          <m:ctrlPr>
+                            <a:rPr lang="en-US" b="0" i="1" smtClean="0"/>
+                          </m:ctrlPr>
+                        </m:sSubPr>
+                        <m:e>
+                          <m:r>
+                            <a:rPr lang="en-US" b="0" i="1" smtClean="0"/>
+                            <m:t>𝑑</m:t>
+                          </m:r>
+                        </m:e>
+                        <m:sub>
+                          <m:r>
+                            <a:rPr lang="en-US" b="0" i="1" smtClean="0"/>
+                            <m:t>𝐺</m:t>
+                          </m:r>
+                        </m:sub>
+                      </m:sSub>
+                      <m:d>
+                        <m:dPr>
+                          <m:ctrlPr>
+                            <a:rPr lang="en-US" b="0" i="1" smtClean="0"/>
+                          </m:ctrlPr>
+                        </m:dPr>
+                        <m:e>
+                          <m:r>
+                            <a:rPr lang="en-US" b="0" i="1" smtClean="0"/>
+                            <m:t>𝑠</m:t>
+                          </m:r>
+                          <m:r>
+                            <a:rPr lang="en-US" b="0" i="1" smtClean="0"/>
+                            <m:t>,</m:t>
+                          </m:r>
+                          <m:r>
+                            <a:rPr lang="en-US" b="0" i="1" smtClean="0"/>
+                            <m:t>𝑡</m:t>
+                          </m:r>
+                        </m:e>
+                      </m:d>
+                      <m:r>
+                        <a:rPr lang="en-US" b="0" i="1" smtClean="0"/>
+                        <m:t>≤</m:t>
+                      </m:r>
+                      <m:func>
+                        <m:funcPr>
+                          <m:ctrlPr>
+                            <a:rPr lang="en-US" i="1" smtClean="0"/>
+                          </m:ctrlPr>
+                        </m:funcPr>
+                        <m:fName>
+                          <m:limLow>
+                            <m:limLowPr>
+                              <m:ctrlPr>
+                                <a:rPr lang="en-US" i="1" smtClean="0"/>
+                              </m:ctrlPr>
+                            </m:limLowPr>
+                            <m:e>
+                              <m:r>
+                                <m:rPr>
+                                  <m:sty m:val="p"/>
+                                </m:rPr>
+                                <a:rPr lang="en-US" i="0" smtClean="0"/>
+                                <m:t>min</m:t>
+                              </m:r>
+                            </m:e>
+                            <m:lim>
+                              <m:r>
+                                <a:rPr lang="en-US" b="0" i="1" smtClean="0"/>
+                                <m:t>𝑗</m:t>
+                              </m:r>
+                            </m:lim>
+                          </m:limLow>
+                        </m:fName>
+                        <m:e>
+                          <m:d>
+                            <m:dPr>
+                              <m:begChr m:val="{"/>
+                              <m:endChr m:val="}"/>
+                              <m:ctrlPr>
+                                <a:rPr lang="en-US" b="0" i="1" smtClean="0"/>
+                              </m:ctrlPr>
+                            </m:dPr>
+                            <m:e>
+                              <m:sSub>
+                                <m:sSubPr>
+                                  <m:ctrlPr>
+                                    <a:rPr lang="en-US" b="0" i="1" smtClean="0"/>
+                                  </m:ctrlPr>
+                                </m:sSubPr>
+                                <m:e>
+                                  <m:r>
+                                    <a:rPr lang="en-US" b="0" i="1" smtClean="0"/>
+                                    <m:t>𝑠</m:t>
+                                  </m:r>
+                                </m:e>
+                                <m:sub>
+                                  <m:r>
+                                    <a:rPr lang="en-US" b="0" i="1" smtClean="0"/>
+                                    <m:t>𝑗</m:t>
+                                  </m:r>
+                                </m:sub>
+                              </m:sSub>
+                              <m:r>
+                                <a:rPr lang="en-US" b="0" i="1" smtClean="0"/>
+                                <m:t>+</m:t>
+                              </m:r>
+                              <m:sSub>
+                                <m:sSubPr>
+                                  <m:ctrlPr>
+                                    <a:rPr lang="en-US" b="0" i="1" smtClean="0"/>
+                                  </m:ctrlPr>
+                                </m:sSubPr>
+                                <m:e>
+                                  <m:r>
+                                    <a:rPr lang="en-US" b="0" i="1" smtClean="0"/>
+                                    <m:t>𝑡</m:t>
+                                  </m:r>
+                                </m:e>
+                                <m:sub>
+                                  <m:r>
+                                    <a:rPr lang="en-US" b="0" i="1" smtClean="0"/>
+                                    <m:t>𝑗</m:t>
+                                  </m:r>
+                                </m:sub>
+                              </m:sSub>
+                            </m:e>
+                          </m:d>
+                        </m:e>
+                      </m:func>
+                      <m:r>
+                        <a:rPr lang="en-US" b="0" i="0" smtClean="0"/>
+                        <m:t>=</m:t>
+                      </m:r>
+                      <m:r>
+                        <m:rPr>
+                          <m:sty m:val="p"/>
+                        </m:rPr>
+                        <a:rPr lang="en-US" b="0" i="0" smtClean="0"/>
+                        <m:t>U</m:t>
+                      </m:r>
+                      <m:r>
+                        <a:rPr lang="en-US" b="0" i="0" smtClean="0"/>
+                        <m:t>,</m:t>
+                      </m:r>
+                    </m:oMath>
+                  </m:oMathPara>
+                </a14:m>
+                <a:endParaRPr lang="en-US" dirty="0" smtClean="0"/>
+              </a:p>
+              <a:p>
+                <a:pPr algn="just"/>
+                <a:r>
+                  <a:rPr lang="ru-RU" dirty="0"/>
+                  <a:t>г</a:t>
+                </a:r>
+                <a:r>
+                  <a:rPr lang="ru-RU" dirty="0" smtClean="0"/>
+                  <a:t>де </a:t>
+                </a:r>
+                <a14:m>
+                  <m:oMath xmlns:m="http://schemas.openxmlformats.org/officeDocument/2006/math">
+                    <m:sSub>
+                      <m:sSubPr>
+                        <m:ctrlPr>
+                          <a:rPr lang="en-US" i="1" smtClean="0"/>
+                        </m:ctrlPr>
+                      </m:sSubPr>
+                      <m:e>
+                        <m:r>
+                          <a:rPr lang="en-US" b="0" i="1" smtClean="0"/>
+                          <m:t>𝑠</m:t>
+                        </m:r>
+                      </m:e>
+                      <m:sub>
+                        <m:r>
+                          <a:rPr lang="en-US" b="0" i="1" smtClean="0"/>
+                          <m:t>𝑖</m:t>
+                        </m:r>
+                      </m:sub>
+                    </m:sSub>
+                  </m:oMath>
+                </a14:m>
+                <a:r>
+                  <a:rPr lang="en-US" dirty="0" smtClean="0"/>
+                  <a:t> -</a:t>
+                </a:r>
+                <a:r>
+                  <a:rPr lang="ru-RU" dirty="0" smtClean="0"/>
+                  <a:t> расстояние от источника до </a:t>
+                </a:r>
+                <a:r>
+                  <a:rPr lang="en-US" i="1" dirty="0" err="1" smtClean="0"/>
+                  <a:t>i</a:t>
+                </a:r>
+                <a:r>
+                  <a:rPr lang="en-US" dirty="0" smtClean="0"/>
+                  <a:t>-</a:t>
+                </a:r>
+                <a:r>
+                  <a:rPr lang="ru-RU" dirty="0" smtClean="0"/>
+                  <a:t>того ориентира, </a:t>
+                </a:r>
+                <a14:m>
+                  <m:oMath xmlns:m="http://schemas.openxmlformats.org/officeDocument/2006/math">
+                    <m:sSub>
+                      <m:sSubPr>
+                        <m:ctrlPr>
+                          <a:rPr lang="en-US" i="1"/>
+                        </m:ctrlPr>
+                      </m:sSubPr>
+                      <m:e>
+                        <m:r>
+                          <a:rPr lang="en-US" b="0" i="1" smtClean="0"/>
+                          <m:t>𝑡</m:t>
+                        </m:r>
+                      </m:e>
+                      <m:sub>
+                        <m:r>
+                          <a:rPr lang="en-US" b="0" i="1" smtClean="0"/>
+                          <m:t>𝑗</m:t>
+                        </m:r>
+                      </m:sub>
+                    </m:sSub>
+                  </m:oMath>
+                </a14:m>
+                <a:r>
+                  <a:rPr lang="ru-RU" dirty="0" smtClean="0"/>
+                  <a:t> - расстояние от стока до</a:t>
+                </a:r>
+                <a:r>
+                  <a:rPr lang="en-US" dirty="0" smtClean="0"/>
+                  <a:t> </a:t>
+                </a:r>
+                <a:r>
+                  <a:rPr lang="en-US" i="1" dirty="0" smtClean="0"/>
+                  <a:t>j</a:t>
+                </a:r>
+                <a:r>
+                  <a:rPr lang="en-US" dirty="0" smtClean="0"/>
+                  <a:t>-</a:t>
+                </a:r>
+                <a:r>
+                  <a:rPr lang="ru-RU" dirty="0" smtClean="0"/>
+                  <a:t>того ориентира. Доказывается, что истинное расстояние от источника </a:t>
+                </a:r>
+                <a:r>
+                  <a:rPr lang="en-US" i="1" dirty="0" smtClean="0"/>
+                  <a:t>s</a:t>
+                </a:r>
+                <a:r>
+                  <a:rPr lang="en-US" dirty="0" smtClean="0"/>
+                  <a:t> </a:t>
+                </a:r>
+                <a:r>
+                  <a:rPr lang="ru-RU" dirty="0" smtClean="0"/>
+                  <a:t>до стока </a:t>
+                </a:r>
+                <a:r>
+                  <a:rPr lang="en-US" i="1" dirty="0" smtClean="0"/>
+                  <a:t>t</a:t>
+                </a:r>
+                <a:r>
+                  <a:rPr lang="ru-RU" dirty="0" smtClean="0"/>
+                  <a:t> ограничено </a:t>
+                </a:r>
+                <a:r>
+                  <a:rPr lang="en-US" i="1" dirty="0" smtClean="0"/>
+                  <a:t>L</a:t>
+                </a:r>
+                <a:r>
+                  <a:rPr lang="ru-RU" i="1" dirty="0" smtClean="0"/>
+                  <a:t> </a:t>
+                </a:r>
+                <a:r>
+                  <a:rPr lang="ru-RU" dirty="0" smtClean="0"/>
+                  <a:t>снизу и </a:t>
+                </a:r>
+                <a:r>
+                  <a:rPr lang="en-US" i="1" dirty="0" smtClean="0"/>
+                  <a:t>U</a:t>
+                </a:r>
+                <a:r>
+                  <a:rPr lang="ru-RU" dirty="0" smtClean="0"/>
+                  <a:t> сверху. Таким образом можно оценивать истинное  расстояние одной из следующих формул: </a:t>
+                </a:r>
+              </a:p>
+              <a:p>
+                <a:pPr algn="just"/>
+                <a14:m>
+                  <m:oMath xmlns:m="http://schemas.openxmlformats.org/officeDocument/2006/math">
+                    <m:sSub>
+                      <m:sSubPr>
+                        <m:ctrlPr>
+                          <a:rPr lang="ru-RU" i="1" smtClean="0">
+                            <a:latin typeface="Cambria Math" panose="02040503050406030204" pitchFamily="18" charset="0"/>
+                          </a:rPr>
+                        </m:ctrlPr>
+                      </m:sSubPr>
+                      <m:e>
+                        <m:acc>
+                          <m:accPr>
+                            <m:chr m:val="̃"/>
+                            <m:ctrlPr>
+                              <a:rPr lang="ru-RU" i="1" smtClean="0">
+                                <a:latin typeface="Cambria Math" panose="02040503050406030204" pitchFamily="18" charset="0"/>
+                              </a:rPr>
+                            </m:ctrlPr>
+                          </m:accPr>
+                          <m:e>
+                            <m:r>
+                              <a:rPr lang="en-US" b="0" i="1" smtClean="0">
+                                <a:latin typeface="Cambria Math" panose="02040503050406030204" pitchFamily="18" charset="0"/>
+                              </a:rPr>
+                              <m:t>𝑑</m:t>
+                            </m:r>
+                          </m:e>
+                        </m:acc>
+                      </m:e>
+                      <m:sub>
+                        <m:r>
+                          <a:rPr lang="en-US" b="0" i="1" smtClean="0">
+                            <a:latin typeface="Cambria Math" panose="02040503050406030204" pitchFamily="18" charset="0"/>
+                          </a:rPr>
+                          <m:t>𝑢</m:t>
+                        </m:r>
+                      </m:sub>
+                    </m:sSub>
+                    <m:d>
+                      <m:dPr>
+                        <m:ctrlPr>
+                          <a:rPr lang="en-US" b="0" i="1" smtClean="0">
+                            <a:latin typeface="Cambria Math" panose="02040503050406030204" pitchFamily="18" charset="0"/>
+                          </a:rPr>
+                        </m:ctrlPr>
+                      </m:dPr>
+                      <m:e>
+                        <m:r>
+                          <a:rPr lang="en-US" b="0" i="1" smtClean="0">
+                            <a:latin typeface="Cambria Math" panose="02040503050406030204" pitchFamily="18" charset="0"/>
+                          </a:rPr>
+                          <m:t>𝑠</m:t>
+                        </m:r>
+                        <m:r>
+                          <a:rPr lang="en-US" b="0" i="1" smtClean="0">
+                            <a:latin typeface="Cambria Math" panose="02040503050406030204" pitchFamily="18" charset="0"/>
+                          </a:rPr>
+                          <m:t>,</m:t>
+                        </m:r>
+                        <m:r>
+                          <a:rPr lang="en-US" b="0" i="1" smtClean="0">
+                            <a:latin typeface="Cambria Math" panose="02040503050406030204" pitchFamily="18" charset="0"/>
+                          </a:rPr>
+                          <m:t>𝑡</m:t>
+                        </m:r>
+                      </m:e>
+                    </m:d>
+                    <m:r>
+                      <a:rPr lang="en-US" b="0" i="1" smtClean="0">
+                        <a:latin typeface="Cambria Math" panose="02040503050406030204" pitchFamily="18" charset="0"/>
+                      </a:rPr>
+                      <m:t>=</m:t>
+                    </m:r>
+                    <m:r>
+                      <a:rPr lang="en-US" b="0" i="1" smtClean="0">
+                        <a:latin typeface="Cambria Math" panose="02040503050406030204" pitchFamily="18" charset="0"/>
+                      </a:rPr>
+                      <m:t>𝑈</m:t>
+                    </m:r>
+                    <m:r>
+                      <a:rPr lang="en-US" b="0" i="1" smtClean="0">
+                        <a:latin typeface="Cambria Math" panose="02040503050406030204" pitchFamily="18" charset="0"/>
+                      </a:rPr>
+                      <m:t>,</m:t>
+                    </m:r>
+                    <m:sSub>
+                      <m:sSubPr>
+                        <m:ctrlPr>
+                          <a:rPr lang="ru-RU" i="1">
+                            <a:latin typeface="Cambria Math" panose="02040503050406030204" pitchFamily="18" charset="0"/>
+                          </a:rPr>
+                        </m:ctrlPr>
+                      </m:sSubPr>
+                      <m:e>
+                        <m:acc>
+                          <m:accPr>
+                            <m:chr m:val="̃"/>
+                            <m:ctrlPr>
+                              <a:rPr lang="ru-RU" i="1">
+                                <a:latin typeface="Cambria Math" panose="02040503050406030204" pitchFamily="18" charset="0"/>
+                              </a:rPr>
+                            </m:ctrlPr>
+                          </m:accPr>
+                          <m:e>
+                            <m:r>
+                              <a:rPr lang="en-US" i="1">
+                                <a:latin typeface="Cambria Math" panose="02040503050406030204" pitchFamily="18" charset="0"/>
+                              </a:rPr>
+                              <m:t>𝑑</m:t>
+                            </m:r>
+                          </m:e>
+                        </m:acc>
+                      </m:e>
+                      <m:sub>
+                        <m:r>
+                          <a:rPr lang="en-US" i="1">
+                            <a:latin typeface="Cambria Math" panose="02040503050406030204" pitchFamily="18" charset="0"/>
+                          </a:rPr>
+                          <m:t>𝑢</m:t>
+                        </m:r>
+                      </m:sub>
+                    </m:sSub>
+                    <m:d>
+                      <m:dPr>
+                        <m:ctrlPr>
+                          <a:rPr lang="en-US" i="1">
+                            <a:latin typeface="Cambria Math" panose="02040503050406030204" pitchFamily="18" charset="0"/>
+                          </a:rPr>
+                        </m:ctrlPr>
+                      </m:dPr>
+                      <m:e>
+                        <m:r>
+                          <a:rPr lang="en-US" i="1">
+                            <a:latin typeface="Cambria Math" panose="02040503050406030204" pitchFamily="18" charset="0"/>
+                          </a:rPr>
+                          <m:t>𝑠</m:t>
+                        </m:r>
+                        <m:r>
+                          <a:rPr lang="en-US" i="1">
+                            <a:latin typeface="Cambria Math" panose="02040503050406030204" pitchFamily="18" charset="0"/>
+                          </a:rPr>
+                          <m:t>,</m:t>
+                        </m:r>
+                        <m:r>
+                          <a:rPr lang="en-US" i="1">
+                            <a:latin typeface="Cambria Math" panose="02040503050406030204" pitchFamily="18" charset="0"/>
+                          </a:rPr>
+                          <m:t>𝑡</m:t>
+                        </m:r>
+                      </m:e>
+                    </m:d>
+                    <m:r>
+                      <a:rPr lang="en-US" b="0" i="1" smtClean="0">
+                        <a:latin typeface="Cambria Math" panose="02040503050406030204" pitchFamily="18" charset="0"/>
+                      </a:rPr>
+                      <m:t>=</m:t>
+                    </m:r>
+                    <m:r>
+                      <a:rPr lang="en-US" b="0" i="1" smtClean="0">
+                        <a:latin typeface="Cambria Math" panose="02040503050406030204" pitchFamily="18" charset="0"/>
+                      </a:rPr>
+                      <m:t>𝐿</m:t>
+                    </m:r>
+                    <m:r>
+                      <a:rPr lang="en-US" b="0" i="1" smtClean="0">
+                        <a:latin typeface="Cambria Math" panose="02040503050406030204" pitchFamily="18" charset="0"/>
+                      </a:rPr>
+                      <m:t>,</m:t>
+                    </m:r>
+                    <m:sSub>
+                      <m:sSubPr>
+                        <m:ctrlPr>
+                          <a:rPr lang="ru-RU" i="1">
+                            <a:latin typeface="Cambria Math" panose="02040503050406030204" pitchFamily="18" charset="0"/>
+                          </a:rPr>
+                        </m:ctrlPr>
+                      </m:sSubPr>
+                      <m:e>
+                        <m:acc>
+                          <m:accPr>
+                            <m:chr m:val="̃"/>
+                            <m:ctrlPr>
+                              <a:rPr lang="ru-RU" i="1">
+                                <a:latin typeface="Cambria Math" panose="02040503050406030204" pitchFamily="18" charset="0"/>
+                              </a:rPr>
+                            </m:ctrlPr>
+                          </m:accPr>
+                          <m:e>
+                            <m:r>
+                              <a:rPr lang="en-US" i="1">
+                                <a:latin typeface="Cambria Math" panose="02040503050406030204" pitchFamily="18" charset="0"/>
+                              </a:rPr>
+                              <m:t>𝑑</m:t>
+                            </m:r>
+                          </m:e>
+                        </m:acc>
+                      </m:e>
+                      <m:sub>
+                        <m:r>
+                          <a:rPr lang="en-US" i="1">
+                            <a:latin typeface="Cambria Math" panose="02040503050406030204" pitchFamily="18" charset="0"/>
+                          </a:rPr>
+                          <m:t>𝑢</m:t>
+                        </m:r>
+                      </m:sub>
+                    </m:sSub>
+                    <m:d>
+                      <m:dPr>
+                        <m:ctrlPr>
+                          <a:rPr lang="en-US" i="1">
+                            <a:latin typeface="Cambria Math" panose="02040503050406030204" pitchFamily="18" charset="0"/>
+                          </a:rPr>
+                        </m:ctrlPr>
+                      </m:dPr>
+                      <m:e>
+                        <m:r>
+                          <a:rPr lang="en-US" i="1">
+                            <a:latin typeface="Cambria Math" panose="02040503050406030204" pitchFamily="18" charset="0"/>
+                          </a:rPr>
+                          <m:t>𝑠</m:t>
+                        </m:r>
+                        <m:r>
+                          <a:rPr lang="en-US" i="1">
+                            <a:latin typeface="Cambria Math" panose="02040503050406030204" pitchFamily="18" charset="0"/>
+                          </a:rPr>
+                          <m:t>,</m:t>
+                        </m:r>
+                        <m:r>
+                          <a:rPr lang="en-US" i="1">
+                            <a:latin typeface="Cambria Math" panose="02040503050406030204" pitchFamily="18" charset="0"/>
+                          </a:rPr>
+                          <m:t>𝑡</m:t>
+                        </m:r>
+                      </m:e>
+                    </m:d>
+                    <m:r>
+                      <a:rPr lang="en-US" b="0" i="1" smtClean="0">
+                        <a:latin typeface="Cambria Math" panose="02040503050406030204" pitchFamily="18" charset="0"/>
+                      </a:rPr>
+                      <m:t>=</m:t>
+                    </m:r>
+                    <m:f>
+                      <m:fPr>
+                        <m:ctrlPr>
+                          <a:rPr lang="en-US" b="0" i="1" smtClean="0">
+                            <a:latin typeface="Cambria Math" panose="02040503050406030204" pitchFamily="18" charset="0"/>
+                          </a:rPr>
+                        </m:ctrlPr>
+                      </m:fPr>
+                      <m:num>
+                        <m:r>
+                          <a:rPr lang="en-US" b="0" i="1" smtClean="0">
+                            <a:latin typeface="Cambria Math" panose="02040503050406030204" pitchFamily="18" charset="0"/>
+                          </a:rPr>
+                          <m:t>𝐿</m:t>
+                        </m:r>
+                        <m:r>
+                          <a:rPr lang="en-US" b="0" i="1" smtClean="0">
+                            <a:latin typeface="Cambria Math" panose="02040503050406030204" pitchFamily="18" charset="0"/>
+                          </a:rPr>
+                          <m:t>+</m:t>
+                        </m:r>
+                        <m:r>
+                          <a:rPr lang="en-US" b="0" i="1" smtClean="0">
+                            <a:latin typeface="Cambria Math" panose="02040503050406030204" pitchFamily="18" charset="0"/>
+                          </a:rPr>
+                          <m:t>𝑈</m:t>
+                        </m:r>
+                      </m:num>
+                      <m:den>
+                        <m:r>
+                          <a:rPr lang="en-US" b="0" i="1" smtClean="0">
+                            <a:latin typeface="Cambria Math" panose="02040503050406030204" pitchFamily="18" charset="0"/>
+                          </a:rPr>
+                          <m:t>2</m:t>
+                        </m:r>
+                      </m:den>
+                    </m:f>
+                    <m:r>
+                      <a:rPr lang="en-US" b="0" i="1" smtClean="0">
+                        <a:latin typeface="Cambria Math" panose="02040503050406030204" pitchFamily="18" charset="0"/>
+                      </a:rPr>
+                      <m:t>,</m:t>
+                    </m:r>
+                    <m:sSub>
+                      <m:sSubPr>
+                        <m:ctrlPr>
+                          <a:rPr lang="ru-RU" i="1">
+                            <a:latin typeface="Cambria Math" panose="02040503050406030204" pitchFamily="18" charset="0"/>
+                          </a:rPr>
+                        </m:ctrlPr>
+                      </m:sSubPr>
+                      <m:e>
+                        <m:acc>
+                          <m:accPr>
+                            <m:chr m:val="̃"/>
+                            <m:ctrlPr>
+                              <a:rPr lang="ru-RU" i="1">
+                                <a:latin typeface="Cambria Math" panose="02040503050406030204" pitchFamily="18" charset="0"/>
+                              </a:rPr>
+                            </m:ctrlPr>
+                          </m:accPr>
+                          <m:e>
+                            <m:r>
+                              <a:rPr lang="en-US" i="1">
+                                <a:latin typeface="Cambria Math" panose="02040503050406030204" pitchFamily="18" charset="0"/>
+                              </a:rPr>
+                              <m:t>𝑑</m:t>
+                            </m:r>
+                          </m:e>
+                        </m:acc>
+                      </m:e>
+                      <m:sub>
+                        <m:r>
+                          <a:rPr lang="en-US" i="1">
+                            <a:latin typeface="Cambria Math" panose="02040503050406030204" pitchFamily="18" charset="0"/>
+                          </a:rPr>
+                          <m:t>𝑢</m:t>
+                        </m:r>
+                      </m:sub>
+                    </m:sSub>
+                    <m:d>
+                      <m:dPr>
+                        <m:ctrlPr>
+                          <a:rPr lang="en-US" i="1">
+                            <a:latin typeface="Cambria Math" panose="02040503050406030204" pitchFamily="18" charset="0"/>
+                          </a:rPr>
+                        </m:ctrlPr>
+                      </m:dPr>
+                      <m:e>
+                        <m:r>
+                          <a:rPr lang="en-US" i="1">
+                            <a:latin typeface="Cambria Math" panose="02040503050406030204" pitchFamily="18" charset="0"/>
+                          </a:rPr>
+                          <m:t>𝑠</m:t>
+                        </m:r>
+                        <m:r>
+                          <a:rPr lang="en-US" i="1">
+                            <a:latin typeface="Cambria Math" panose="02040503050406030204" pitchFamily="18" charset="0"/>
+                          </a:rPr>
+                          <m:t>,</m:t>
+                        </m:r>
+                        <m:r>
+                          <a:rPr lang="en-US" i="1">
+                            <a:latin typeface="Cambria Math" panose="02040503050406030204" pitchFamily="18" charset="0"/>
+                          </a:rPr>
+                          <m:t>𝑡</m:t>
+                        </m:r>
+                      </m:e>
+                    </m:d>
+                    <m:r>
+                      <a:rPr lang="en-US" b="0" i="1" smtClean="0">
+                        <a:latin typeface="Cambria Math" panose="02040503050406030204" pitchFamily="18" charset="0"/>
+                      </a:rPr>
+                      <m:t>=</m:t>
+                    </m:r>
+                    <m:rad>
+                      <m:radPr>
+                        <m:degHide m:val="on"/>
+                        <m:ctrlPr>
+                          <a:rPr lang="en-US" i="1" smtClean="0">
+                            <a:latin typeface="Cambria Math" panose="02040503050406030204" pitchFamily="18" charset="0"/>
+                          </a:rPr>
+                        </m:ctrlPr>
+                      </m:radPr>
+                      <m:deg/>
+                      <m:e>
+                        <m:r>
+                          <a:rPr lang="en-US" b="0" i="1" smtClean="0">
+                            <a:latin typeface="Cambria Math" panose="02040503050406030204" pitchFamily="18" charset="0"/>
+                          </a:rPr>
+                          <m:t>𝐿</m:t>
+                        </m:r>
+                        <m:r>
+                          <a:rPr lang="en-US" b="0" i="1" smtClean="0">
+                            <a:latin typeface="Cambria Math" panose="02040503050406030204" pitchFamily="18" charset="0"/>
+                            <a:ea typeface="Cambria Math" panose="02040503050406030204" pitchFamily="18" charset="0"/>
+                          </a:rPr>
+                          <m:t>∙</m:t>
+                        </m:r>
+                        <m:r>
+                          <a:rPr lang="en-US" b="0" i="1" smtClean="0">
+                            <a:latin typeface="Cambria Math" panose="02040503050406030204" pitchFamily="18" charset="0"/>
+                            <a:ea typeface="Cambria Math" panose="02040503050406030204" pitchFamily="18" charset="0"/>
+                          </a:rPr>
+                          <m:t>𝑈</m:t>
+                        </m:r>
+                      </m:e>
+                    </m:rad>
+                  </m:oMath>
+                </a14:m>
+                <a:endParaRPr lang="ru-RU" dirty="0" smtClean="0"/>
+              </a:p>
+            </p:txBody>
+          </p:sp>
+        </mc:Choice>
+        <mc:Fallback>
+          <p:sp>
+            <p:nvSpPr>
+              <p:cNvPr id="3" name="Объект 2"/>
+              <p:cNvSpPr>
+                <a:spLocks noGrp="1" noRot="1" noChangeAspect="1" noMove="1" noResize="1" noEditPoints="1" noAdjustHandles="1" noChangeArrowheads="1" noChangeShapeType="1" noTextEdit="1"/>
+              </p:cNvSpPr>
+              <p:nvPr>
+                <p:ph idx="1"/>
+              </p:nvPr>
+            </p:nvSpPr>
+            <p:spPr>
+              <a:xfrm>
+                <a:off x="241300" y="1845734"/>
+                <a:ext cx="11811000" cy="4428066"/>
+              </a:xfrm>
+              <a:blipFill rotWithShape="0">
+                <a:blip r:embed="rId2"/>
+                <a:stretch>
+                  <a:fillRect l="-1342" t="-1515" r="-1342"/>
+                </a:stretch>
+              </a:blipFill>
+            </p:spPr>
+            <p:txBody>
+              <a:bodyPr/>
+              <a:lstStyle/>
+              <a:p>
+                <a:r>
+                  <a:rPr lang="ru-RU">
+                    <a:noFill/>
+                  </a:rPr>
+                  <a:t> </a:t>
+                </a:r>
+              </a:p>
+            </p:txBody>
+          </p:sp>
+        </mc:Fallback>
+      </mc:AlternateContent>
+      <p:sp>
+        <p:nvSpPr>
+          <p:cNvPr id="4" name="Номер слайда 3"/>
+          <p:cNvSpPr>
+            <a:spLocks noGrp="1"/>
+          </p:cNvSpPr>
+          <p:nvPr>
+            <p:ph type="sldNum" sz="quarter" idx="12"/>
+          </p:nvPr>
+        </p:nvSpPr>
+        <p:spPr/>
+        <p:txBody>
+          <a:bodyPr/>
+          <a:lstStyle/>
+          <a:p>
+            <a:fld id="{4C26D218-B7FE-4641-BC62-5B95ECF50343}" type="slidenum">
+              <a:rPr lang="ru-RU" smtClean="0"/>
+              <a:t>5</a:t>
+            </a:fld>
+            <a:endParaRPr lang="ru-RU"/>
+          </a:p>
+        </p:txBody>
+      </p:sp>
+    </p:spTree>
+    <p:extLst>
+      <p:ext uri="{BB962C8B-B14F-4D97-AF65-F5344CB8AC3E}">
+        <p14:creationId xmlns:p14="http://schemas.microsoft.com/office/powerpoint/2010/main" val="945649165"/>
+      </p:ext>
+    </p:extLst>
+  </p:cSld>
+  <p:clrMapOvr>
+    <a:masterClrMapping/>
+  </p:clrMapOvr>
+  <p:timing>
+    <p:tnLst>
+      <p:par>
+        <p:cTn id="1" dur="indefinite" restart="never" nodeType="tmRoot"/>
+      </p:par>
+    </p:tnLst>
+  </p:timing>
+</p:sld>
+</file>
+
+<file path=ppt/slides/slide6.xml><?xml version="1.0" encoding="utf-8"?>
+<p:sld xmlns:a="http://schemas.openxmlformats.org/drawingml/2006/main" xmlns:r="http://schemas.openxmlformats.org/officeDocument/2006/relationships" xmlns:p="http://schemas.openxmlformats.org/presentationml/2006/main">
+  <p:cSld>
+    <p:spTree>
+      <p:nvGrpSpPr>
+        <p:cNvPr id="1" name=""/>
+        <p:cNvGrpSpPr/>
+        <p:nvPr/>
+      </p:nvGrpSpPr>
+      <p:grpSpPr>
+        <a:xfrm>
+          <a:off x="0" y="0"/>
+          <a:ext cx="0" cy="0"/>
+          <a:chOff x="0" y="0"/>
+          <a:chExt cx="0" cy="0"/>
+        </a:xfrm>
+      </p:grpSpPr>
+      <p:sp>
+        <p:nvSpPr>
+          <p:cNvPr id="2" name="Заголовок 1"/>
+          <p:cNvSpPr>
+            <a:spLocks noGrp="1"/>
+          </p:cNvSpPr>
+          <p:nvPr>
+            <p:ph type="title"/>
+          </p:nvPr>
+        </p:nvSpPr>
+        <p:spPr/>
+        <p:txBody>
+          <a:bodyPr/>
+          <a:lstStyle/>
+          <a:p>
+            <a:pPr algn="ctr"/>
+            <a:r>
+              <a:rPr lang="ru-RU" dirty="0" smtClean="0"/>
+              <a:t>Выбор ориентиров</a:t>
+            </a:r>
+            <a:endParaRPr lang="ru-RU" dirty="0"/>
+          </a:p>
+        </p:txBody>
+      </p:sp>
+      <p:sp>
+        <p:nvSpPr>
+          <p:cNvPr id="3" name="Объект 2"/>
+          <p:cNvSpPr>
+            <a:spLocks noGrp="1"/>
+          </p:cNvSpPr>
+          <p:nvPr>
+            <p:ph idx="1"/>
+          </p:nvPr>
+        </p:nvSpPr>
+        <p:spPr/>
+        <p:txBody>
+          <a:bodyPr/>
+          <a:lstStyle/>
+          <a:p>
+            <a:pPr marL="0" indent="0">
+              <a:buNone/>
+            </a:pPr>
+            <a:r>
+              <a:rPr lang="ru-RU" dirty="0" smtClean="0"/>
+              <a:t>	Существует несколько подходов к выбору вершин-ориентиров:</a:t>
+            </a:r>
+          </a:p>
+          <a:p>
+            <a:pPr>
+              <a:buFont typeface="Arial" panose="020B0604020202020204" pitchFamily="34" charset="0"/>
+              <a:buChar char="•"/>
+            </a:pPr>
+            <a:r>
+              <a:rPr lang="ru-RU" dirty="0" smtClean="0"/>
+              <a:t> </a:t>
+            </a:r>
+            <a:r>
+              <a:rPr lang="ru-RU" b="1" dirty="0" smtClean="0"/>
+              <a:t>Случайный </a:t>
+            </a:r>
+            <a:r>
+              <a:rPr lang="ru-RU" dirty="0" smtClean="0"/>
+              <a:t>– выбираются</a:t>
+            </a:r>
+            <a:r>
+              <a:rPr lang="en-US" dirty="0" smtClean="0"/>
+              <a:t> </a:t>
+            </a:r>
+            <a:r>
+              <a:rPr lang="ru-RU" dirty="0" smtClean="0"/>
+              <a:t>случайные вершины, распределённые равномерно по графу.</a:t>
+            </a:r>
+          </a:p>
+          <a:p>
+            <a:pPr>
+              <a:buFont typeface="Arial" panose="020B0604020202020204" pitchFamily="34" charset="0"/>
+              <a:buChar char="•"/>
+            </a:pPr>
+            <a:r>
+              <a:rPr lang="ru-RU" dirty="0"/>
+              <a:t> </a:t>
+            </a:r>
+            <a:r>
+              <a:rPr lang="ru-RU" b="1" dirty="0" smtClean="0"/>
+              <a:t>Наибольшие степени</a:t>
+            </a:r>
+            <a:r>
+              <a:rPr lang="ru-RU" dirty="0" smtClean="0"/>
+              <a:t> – выбираются вершины, имеющие наибольшие степени. </a:t>
+            </a:r>
+            <a:r>
+              <a:rPr lang="ru-RU" dirty="0"/>
+              <a:t>Интуитивно понятно, чем </a:t>
+            </a:r>
+            <a:r>
+              <a:rPr lang="ru-RU" dirty="0" smtClean="0"/>
+              <a:t>больше связей у вершины, </a:t>
+            </a:r>
+            <a:r>
+              <a:rPr lang="ru-RU" dirty="0"/>
+              <a:t>тем выше вероятность того, что </a:t>
+            </a:r>
+            <a:r>
+              <a:rPr lang="ru-RU" dirty="0" smtClean="0"/>
+              <a:t>она находится на </a:t>
+            </a:r>
+            <a:r>
+              <a:rPr lang="ru-RU" dirty="0"/>
+              <a:t>многих кратчайших путях</a:t>
+            </a:r>
+            <a:r>
+              <a:rPr lang="ru-RU" dirty="0" smtClean="0"/>
+              <a:t>.</a:t>
+            </a:r>
+          </a:p>
+          <a:p>
+            <a:pPr>
+              <a:buFont typeface="Arial" panose="020B0604020202020204" pitchFamily="34" charset="0"/>
+              <a:buChar char="•"/>
+            </a:pPr>
+            <a:r>
+              <a:rPr lang="ru-RU" dirty="0"/>
+              <a:t> </a:t>
+            </a:r>
+            <a:r>
+              <a:rPr lang="ru-RU" b="1" dirty="0" smtClean="0"/>
+              <a:t>Центральность</a:t>
+            </a:r>
+            <a:r>
+              <a:rPr lang="ru-RU" dirty="0" smtClean="0"/>
+              <a:t> – выбираются вершины с наименьшей центральностью</a:t>
+            </a:r>
+            <a:r>
+              <a:rPr lang="ru-RU" dirty="0"/>
+              <a:t>. Интуитивно понятно</a:t>
+            </a:r>
+            <a:r>
+              <a:rPr lang="ru-RU" dirty="0" smtClean="0"/>
+              <a:t>, </a:t>
+            </a:r>
+            <a:r>
+              <a:rPr lang="ru-RU" dirty="0"/>
+              <a:t>что чем ближе </a:t>
+            </a:r>
+            <a:r>
+              <a:rPr lang="ru-RU" dirty="0" smtClean="0"/>
+              <a:t>вершина оказывается </a:t>
+            </a:r>
+            <a:r>
+              <a:rPr lang="ru-RU" dirty="0"/>
+              <a:t>к остальным узлам, тем больше вероятность того, что она находится на многих кратчайших путях.</a:t>
+            </a:r>
+          </a:p>
+        </p:txBody>
+      </p:sp>
+      <p:sp>
+        <p:nvSpPr>
+          <p:cNvPr id="4" name="Номер слайда 3"/>
+          <p:cNvSpPr>
+            <a:spLocks noGrp="1"/>
+          </p:cNvSpPr>
+          <p:nvPr>
+            <p:ph type="sldNum" sz="quarter" idx="12"/>
+          </p:nvPr>
+        </p:nvSpPr>
+        <p:spPr/>
+        <p:txBody>
+          <a:bodyPr/>
+          <a:lstStyle/>
+          <a:p>
+            <a:fld id="{4C26D218-B7FE-4641-BC62-5B95ECF50343}" type="slidenum">
+              <a:rPr lang="ru-RU" smtClean="0"/>
+              <a:t>6</a:t>
+            </a:fld>
+            <a:endParaRPr lang="ru-RU"/>
+          </a:p>
+        </p:txBody>
+      </p:sp>
+    </p:spTree>
+    <p:extLst>
+      <p:ext uri="{BB962C8B-B14F-4D97-AF65-F5344CB8AC3E}">
+        <p14:creationId xmlns:p14="http://schemas.microsoft.com/office/powerpoint/2010/main" val="2292645143"/>
+      </p:ext>
+    </p:extLst>
+  </p:cSld>
+  <p:clrMapOvr>
+    <a:masterClrMapping/>
+  </p:clrMapOvr>
+</p:sld>
+</file>
+
+<file path=ppt/slides/slide7.xml><?xml version="1.0" encoding="utf-8"?>
+<p:sld xmlns:a="http://schemas.openxmlformats.org/drawingml/2006/main" xmlns:r="http://schemas.openxmlformats.org/officeDocument/2006/relationships" xmlns:p="http://schemas.openxmlformats.org/presentationml/2006/main">
+  <p:cSld>
+    <p:spTree>
+      <p:nvGrpSpPr>
+        <p:cNvPr id="1" name=""/>
+        <p:cNvGrpSpPr/>
+        <p:nvPr/>
+      </p:nvGrpSpPr>
+      <p:grpSpPr>
+        <a:xfrm>
+          <a:off x="0" y="0"/>
+          <a:ext cx="0" cy="0"/>
+          <a:chOff x="0" y="0"/>
+          <a:chExt cx="0" cy="0"/>
+        </a:xfrm>
+      </p:grpSpPr>
+      <p:sp>
+        <p:nvSpPr>
+          <p:cNvPr id="2" name="Заголовок 1"/>
+          <p:cNvSpPr>
+            <a:spLocks noGrp="1"/>
+          </p:cNvSpPr>
+          <p:nvPr>
+            <p:ph type="title"/>
+          </p:nvPr>
+        </p:nvSpPr>
+        <p:spPr/>
+        <p:txBody>
+          <a:bodyPr/>
+          <a:lstStyle/>
+          <a:p>
+            <a:pPr algn="ctr"/>
+            <a:r>
+              <a:rPr lang="ru-RU" dirty="0" smtClean="0"/>
+              <a:t>Выбор ориентиров</a:t>
+            </a:r>
+            <a:endParaRPr lang="ru-RU" dirty="0"/>
+          </a:p>
+        </p:txBody>
+      </p:sp>
+      <p:sp>
+        <p:nvSpPr>
+          <p:cNvPr id="3" name="Объект 2"/>
+          <p:cNvSpPr>
+            <a:spLocks noGrp="1"/>
+          </p:cNvSpPr>
+          <p:nvPr>
+            <p:ph idx="1"/>
+          </p:nvPr>
+        </p:nvSpPr>
+        <p:spPr/>
+        <p:txBody>
+          <a:bodyPr/>
+          <a:lstStyle/>
+          <a:p>
+            <a:pPr marL="0" indent="0" algn="just">
+              <a:buNone/>
+            </a:pPr>
+            <a:r>
+              <a:rPr lang="en-US" dirty="0" smtClean="0"/>
+              <a:t>	</a:t>
+            </a:r>
+            <a:r>
+              <a:rPr lang="ru-RU" dirty="0" smtClean="0"/>
+              <a:t>Так </a:t>
+            </a:r>
+            <a:r>
+              <a:rPr lang="ru-RU" dirty="0"/>
+              <a:t>как вычисление коэффициентов центральности для каждой вершины графа очень дорогостоящая операция, то для </a:t>
+            </a:r>
+            <a:r>
+              <a:rPr lang="ru-RU" dirty="0" smtClean="0"/>
+              <a:t>масштабирования данной стратегии </a:t>
+            </a:r>
+            <a:r>
+              <a:rPr lang="ru-RU" dirty="0"/>
+              <a:t>выбора ориентиров на большие сети необходимо вычислять центральности приближенно следующим образом: выбираются случайные вершины (семена) и вычисляются дистанции от каждой вершины графа до каждого семени. Так как начальные числа выбираются равномерно случайным образом и предполагается, что расстояния графов ограничены небольшим числом (что верно, поскольку реальные графы обычно имеют небольшой диаметр), то, используя неравенство </a:t>
+            </a:r>
+            <a:r>
+              <a:rPr lang="ru-RU" dirty="0" err="1"/>
+              <a:t>Хёффдинга</a:t>
+            </a:r>
+            <a:r>
+              <a:rPr lang="ru-RU" dirty="0"/>
+              <a:t>, показывается</a:t>
+            </a:r>
+            <a:r>
+              <a:rPr lang="en-US" dirty="0"/>
+              <a:t> </a:t>
+            </a:r>
+            <a:r>
+              <a:rPr lang="ru-RU" dirty="0"/>
+              <a:t>возможность получения сколь угодно хорошего приближение к центральности посредством выбора постоянного числа семян.</a:t>
+            </a:r>
+          </a:p>
+        </p:txBody>
+      </p:sp>
+      <p:sp>
+        <p:nvSpPr>
+          <p:cNvPr id="4" name="Номер слайда 3"/>
+          <p:cNvSpPr>
+            <a:spLocks noGrp="1"/>
+          </p:cNvSpPr>
+          <p:nvPr>
+            <p:ph type="sldNum" sz="quarter" idx="12"/>
+          </p:nvPr>
+        </p:nvSpPr>
+        <p:spPr/>
+        <p:txBody>
+          <a:bodyPr/>
+          <a:lstStyle/>
+          <a:p>
+            <a:fld id="{4C26D218-B7FE-4641-BC62-5B95ECF50343}" type="slidenum">
+              <a:rPr lang="ru-RU" smtClean="0"/>
+              <a:t>7</a:t>
+            </a:fld>
+            <a:endParaRPr lang="ru-RU"/>
+          </a:p>
+        </p:txBody>
+      </p:sp>
+    </p:spTree>
+    <p:extLst>
+      <p:ext uri="{BB962C8B-B14F-4D97-AF65-F5344CB8AC3E}">
+        <p14:creationId xmlns:p14="http://schemas.microsoft.com/office/powerpoint/2010/main" val="2056240577"/>
+      </p:ext>
+    </p:extLst>
+  </p:cSld>
+  <p:clrMapOvr>
+    <a:masterClrMapping/>
+  </p:clrMapOvr>
+</p:sld>
+</file>
+
+<file path=ppt/slides/slide8.xml><?xml version="1.0" encoding="utf-8"?>
+<p:sld xmlns:a="http://schemas.openxmlformats.org/drawingml/2006/main" xmlns:r="http://schemas.openxmlformats.org/officeDocument/2006/relationships" xmlns:p="http://schemas.openxmlformats.org/presentationml/2006/main">
+  <p:cSld>
+    <p:spTree>
+      <p:nvGrpSpPr>
+        <p:cNvPr id="1" name=""/>
+        <p:cNvGrpSpPr/>
+        <p:nvPr/>
+      </p:nvGrpSpPr>
+      <p:grpSpPr>
+        <a:xfrm>
+          <a:off x="0" y="0"/>
+          <a:ext cx="0" cy="0"/>
+          <a:chOff x="0" y="0"/>
+          <a:chExt cx="0" cy="0"/>
+        </a:xfrm>
+      </p:grpSpPr>
+      <p:sp>
+        <p:nvSpPr>
+          <p:cNvPr id="2" name="Заголовок 1"/>
+          <p:cNvSpPr>
+            <a:spLocks noGrp="1"/>
+          </p:cNvSpPr>
+          <p:nvPr>
+            <p:ph type="title"/>
+          </p:nvPr>
+        </p:nvSpPr>
+        <p:spPr/>
+        <p:txBody>
+          <a:bodyPr/>
+          <a:lstStyle/>
+          <a:p>
+            <a:pPr algn="ctr"/>
+            <a:r>
+              <a:rPr lang="ru-RU" dirty="0" smtClean="0"/>
+              <a:t>Выбор ориентиров</a:t>
+            </a:r>
+            <a:endParaRPr lang="ru-RU" dirty="0"/>
+          </a:p>
+        </p:txBody>
+      </p:sp>
+      <p:sp>
+        <p:nvSpPr>
+          <p:cNvPr id="3" name="Объект 2"/>
+          <p:cNvSpPr>
+            <a:spLocks noGrp="1"/>
+          </p:cNvSpPr>
+          <p:nvPr>
+            <p:ph idx="1"/>
+          </p:nvPr>
+        </p:nvSpPr>
+        <p:spPr/>
+        <p:txBody>
+          <a:bodyPr/>
+          <a:lstStyle/>
+          <a:p>
+            <a:pPr marL="0" indent="0" algn="just">
+              <a:buNone/>
+            </a:pPr>
+            <a:r>
+              <a:rPr lang="en-US" dirty="0" smtClean="0"/>
+              <a:t>	</a:t>
+            </a:r>
+            <a:r>
+              <a:rPr lang="ru-RU" dirty="0"/>
+              <a:t>При использовании </a:t>
+            </a:r>
+            <a:r>
+              <a:rPr lang="ru-RU" dirty="0" smtClean="0"/>
+              <a:t>стратегий, описанных </a:t>
+            </a:r>
+            <a:r>
+              <a:rPr lang="ru-RU" dirty="0"/>
+              <a:t>выше, может случиться так, что </a:t>
+            </a:r>
+            <a:r>
+              <a:rPr lang="ru-RU" dirty="0" smtClean="0"/>
+              <a:t>ориентир</a:t>
+            </a:r>
+            <a:r>
+              <a:rPr lang="ru-RU" dirty="0"/>
+              <a:t>, который мы выбираем, покрывает набор </a:t>
+            </a:r>
+            <a:r>
+              <a:rPr lang="ru-RU" dirty="0" smtClean="0"/>
+              <a:t>вершин, </a:t>
+            </a:r>
+            <a:r>
+              <a:rPr lang="ru-RU" dirty="0"/>
+              <a:t>аналогичный </a:t>
+            </a:r>
+            <a:r>
+              <a:rPr lang="ru-RU" dirty="0" smtClean="0"/>
+              <a:t>другому ориентиру, </a:t>
+            </a:r>
+            <a:r>
+              <a:rPr lang="ru-RU" dirty="0"/>
+              <a:t>и, таким образом, его вклад в покрытие невелик</a:t>
+            </a:r>
+            <a:r>
+              <a:rPr lang="ru-RU" dirty="0" smtClean="0"/>
+              <a:t>.</a:t>
+            </a:r>
+          </a:p>
+          <a:p>
+            <a:pPr algn="just"/>
+            <a:r>
+              <a:rPr lang="ru-RU" dirty="0" smtClean="0"/>
+              <a:t>	Для решения данной проблемы используются два метода:</a:t>
+            </a:r>
+          </a:p>
+          <a:p>
+            <a:pPr algn="just">
+              <a:buFont typeface="Arial" panose="020B0604020202020204" pitchFamily="34" charset="0"/>
+              <a:buChar char="•"/>
+            </a:pPr>
+            <a:r>
+              <a:rPr lang="ru-RU" dirty="0"/>
+              <a:t> </a:t>
+            </a:r>
+            <a:r>
+              <a:rPr lang="ru-RU" dirty="0" smtClean="0"/>
+              <a:t>Ограничение</a:t>
+            </a:r>
+          </a:p>
+          <a:p>
+            <a:pPr algn="just">
+              <a:buFont typeface="Arial" panose="020B0604020202020204" pitchFamily="34" charset="0"/>
+              <a:buChar char="•"/>
+            </a:pPr>
+            <a:r>
+              <a:rPr lang="ru-RU" dirty="0"/>
+              <a:t> </a:t>
+            </a:r>
+            <a:r>
+              <a:rPr lang="ru-RU" dirty="0" smtClean="0"/>
+              <a:t>Разделение</a:t>
+            </a:r>
+            <a:endParaRPr lang="ru-RU" dirty="0"/>
+          </a:p>
+        </p:txBody>
+      </p:sp>
+      <p:sp>
+        <p:nvSpPr>
+          <p:cNvPr id="4" name="Номер слайда 3"/>
+          <p:cNvSpPr>
+            <a:spLocks noGrp="1"/>
+          </p:cNvSpPr>
+          <p:nvPr>
+            <p:ph type="sldNum" sz="quarter" idx="12"/>
+          </p:nvPr>
+        </p:nvSpPr>
+        <p:spPr/>
+        <p:txBody>
+          <a:bodyPr/>
+          <a:lstStyle/>
+          <a:p>
+            <a:fld id="{4C26D218-B7FE-4641-BC62-5B95ECF50343}" type="slidenum">
+              <a:rPr lang="ru-RU" smtClean="0"/>
+              <a:t>8</a:t>
+            </a:fld>
+            <a:endParaRPr lang="ru-RU"/>
+          </a:p>
+        </p:txBody>
+      </p:sp>
+    </p:spTree>
+    <p:extLst>
+      <p:ext uri="{BB962C8B-B14F-4D97-AF65-F5344CB8AC3E}">
+        <p14:creationId xmlns:p14="http://schemas.microsoft.com/office/powerpoint/2010/main" val="298446376"/>
+      </p:ext>
+    </p:extLst>
+  </p:cSld>
+  <p:clrMapOvr>
+    <a:masterClrMapping/>
+  </p:clrMapOvr>
+</p:sld>
+</file>
+
+<file path=ppt/slides/slide9.xml><?xml version="1.0" encoding="utf-8"?>
+<p:sld xmlns:a="http://schemas.openxmlformats.org/drawingml/2006/main" xmlns:r="http://schemas.openxmlformats.org/officeDocument/2006/relationships" xmlns:p="http://schemas.openxmlformats.org/presentationml/2006/main">
+  <p:cSld>
+    <p:spTree>
+      <p:nvGrpSpPr>
+        <p:cNvPr id="1" name=""/>
+        <p:cNvGrpSpPr/>
+        <p:nvPr/>
+      </p:nvGrpSpPr>
+      <p:grpSpPr>
+        <a:xfrm>
+          <a:off x="0" y="0"/>
+          <a:ext cx="0" cy="0"/>
+          <a:chOff x="0" y="0"/>
+          <a:chExt cx="0" cy="0"/>
+        </a:xfrm>
+      </p:grpSpPr>
+      <p:sp>
+        <p:nvSpPr>
+          <p:cNvPr id="2" name="Заголовок 1"/>
+          <p:cNvSpPr>
+            <a:spLocks noGrp="1"/>
+          </p:cNvSpPr>
+          <p:nvPr>
+            <p:ph type="title"/>
+          </p:nvPr>
+        </p:nvSpPr>
+        <p:spPr/>
+        <p:txBody>
+          <a:bodyPr/>
+          <a:lstStyle/>
+          <a:p>
+            <a:pPr algn="ctr"/>
+            <a:r>
+              <a:rPr lang="ru-RU" dirty="0"/>
+              <a:t>Выбор ориентиров</a:t>
+            </a:r>
+          </a:p>
+        </p:txBody>
+      </p:sp>
+      <p:sp>
+        <p:nvSpPr>
+          <p:cNvPr id="6" name="Текст 5"/>
+          <p:cNvSpPr>
+            <a:spLocks noGrp="1"/>
+          </p:cNvSpPr>
+          <p:nvPr>
+            <p:ph type="body" idx="1"/>
+          </p:nvPr>
+        </p:nvSpPr>
+        <p:spPr/>
+        <p:txBody>
+          <a:bodyPr/>
+          <a:lstStyle/>
+          <a:p>
+            <a:pPr algn="ctr"/>
+            <a:r>
+              <a:rPr lang="ru-RU" dirty="0" smtClean="0"/>
+              <a:t>Ограничение</a:t>
+            </a:r>
+            <a:endParaRPr lang="ru-RU" dirty="0"/>
+          </a:p>
+        </p:txBody>
+      </p:sp>
+      <p:sp>
+        <p:nvSpPr>
+          <p:cNvPr id="7" name="Объект 6"/>
+          <p:cNvSpPr>
+            <a:spLocks noGrp="1"/>
+          </p:cNvSpPr>
+          <p:nvPr>
+            <p:ph sz="half" idx="2"/>
+          </p:nvPr>
+        </p:nvSpPr>
+        <p:spPr>
+          <a:xfrm>
+            <a:off x="272562" y="2582334"/>
+            <a:ext cx="5762478" cy="3695374"/>
+          </a:xfrm>
+        </p:spPr>
+        <p:txBody>
+          <a:bodyPr>
+            <a:noAutofit/>
+          </a:bodyPr>
+          <a:lstStyle/>
+          <a:p>
+            <a:pPr marL="0" indent="0">
+              <a:buNone/>
+            </a:pPr>
+            <a:r>
+              <a:rPr lang="ru-RU" dirty="0" smtClean="0"/>
+              <a:t>	Сначала ранжируем вершины в </a:t>
+            </a:r>
+            <a:r>
+              <a:rPr lang="ru-RU" dirty="0"/>
+              <a:t>соответствии с какой-либо </a:t>
+            </a:r>
+            <a:r>
+              <a:rPr lang="ru-RU" dirty="0" smtClean="0"/>
+              <a:t>из вышеописанных стратегий. </a:t>
+            </a:r>
+            <a:r>
+              <a:rPr lang="ru-RU" dirty="0"/>
+              <a:t>Затем </a:t>
+            </a:r>
+            <a:r>
+              <a:rPr lang="ru-RU" dirty="0" smtClean="0"/>
+              <a:t>итеративно </a:t>
+            </a:r>
+            <a:r>
+              <a:rPr lang="ru-RU" dirty="0"/>
+              <a:t>выбираем ориентиры в соответствии с их рангом. Для каждого выбранного ориентира </a:t>
+            </a:r>
+            <a:r>
+              <a:rPr lang="ru-RU" i="1" dirty="0"/>
+              <a:t>l</a:t>
+            </a:r>
+            <a:r>
+              <a:rPr lang="ru-RU" dirty="0"/>
+              <a:t> </a:t>
+            </a:r>
+            <a:r>
+              <a:rPr lang="ru-RU" dirty="0" smtClean="0"/>
+              <a:t>отбрасываем </a:t>
+            </a:r>
+            <a:r>
+              <a:rPr lang="ru-RU" dirty="0"/>
+              <a:t>из рассмотрения все узлы, находящиеся на расстоянии </a:t>
+            </a:r>
+            <a:r>
+              <a:rPr lang="en-US" i="1" dirty="0" smtClean="0"/>
+              <a:t>h </a:t>
+            </a:r>
+            <a:r>
+              <a:rPr lang="en-US" dirty="0" smtClean="0"/>
+              <a:t>(</a:t>
+            </a:r>
+            <a:r>
+              <a:rPr lang="ru-RU" dirty="0" smtClean="0"/>
+              <a:t>или меньшем</a:t>
+            </a:r>
+            <a:r>
+              <a:rPr lang="en-US" dirty="0" smtClean="0"/>
+              <a:t>)</a:t>
+            </a:r>
+            <a:r>
+              <a:rPr lang="ru-RU" dirty="0" smtClean="0"/>
+              <a:t> </a:t>
+            </a:r>
+            <a:r>
+              <a:rPr lang="ru-RU" dirty="0"/>
+              <a:t>от </a:t>
+            </a:r>
+            <a:r>
+              <a:rPr lang="ru-RU" i="1" dirty="0"/>
+              <a:t>l</a:t>
+            </a:r>
+            <a:r>
+              <a:rPr lang="ru-RU" dirty="0"/>
+              <a:t>. Процесс повторяется до тех пор, пока не </a:t>
+            </a:r>
+            <a:r>
+              <a:rPr lang="ru-RU" dirty="0" smtClean="0"/>
+              <a:t>будет выбрано необходимое число ориентиров. </a:t>
+            </a:r>
+          </a:p>
+          <a:p>
+            <a:pPr marL="0" indent="0">
+              <a:buNone/>
+            </a:pPr>
+            <a:r>
+              <a:rPr lang="ru-RU" dirty="0"/>
+              <a:t>	</a:t>
+            </a:r>
+            <a:r>
+              <a:rPr lang="ru-RU" dirty="0" smtClean="0"/>
+              <a:t>В проделанной работе использовался именно этот метод</a:t>
+            </a:r>
+            <a:r>
+              <a:rPr lang="en-US" dirty="0" smtClean="0"/>
+              <a:t>, </a:t>
+            </a:r>
+            <a:r>
+              <a:rPr lang="ru-RU" dirty="0" smtClean="0"/>
+              <a:t>а </a:t>
+            </a:r>
+            <a:r>
+              <a:rPr lang="en-US" i="1" dirty="0" smtClean="0"/>
+              <a:t>h </a:t>
+            </a:r>
+            <a:r>
+              <a:rPr lang="ru-RU" dirty="0" smtClean="0"/>
+              <a:t>было принято равным 1</a:t>
+            </a:r>
+            <a:r>
+              <a:rPr lang="en-US" dirty="0" smtClean="0"/>
+              <a:t> </a:t>
+            </a:r>
+            <a:r>
+              <a:rPr lang="ru-RU" dirty="0" smtClean="0"/>
+              <a:t>так как при этом были получены наилучшие результаты.</a:t>
+            </a:r>
+            <a:r>
+              <a:rPr lang="en-US" i="1" dirty="0" smtClean="0"/>
+              <a:t> </a:t>
+            </a:r>
+            <a:endParaRPr lang="ru-RU" i="1" dirty="0" smtClean="0"/>
+          </a:p>
+          <a:p>
+            <a:pPr marL="0" indent="0">
+              <a:buNone/>
+            </a:pPr>
+            <a:endParaRPr lang="ru-RU" dirty="0"/>
+          </a:p>
+        </p:txBody>
+      </p:sp>
+      <p:sp>
+        <p:nvSpPr>
+          <p:cNvPr id="8" name="Текст 7"/>
+          <p:cNvSpPr>
+            <a:spLocks noGrp="1"/>
+          </p:cNvSpPr>
+          <p:nvPr>
+            <p:ph type="body" sz="quarter" idx="3"/>
+          </p:nvPr>
+        </p:nvSpPr>
+        <p:spPr/>
+        <p:txBody>
+          <a:bodyPr/>
+          <a:lstStyle/>
+          <a:p>
+            <a:pPr algn="ctr"/>
+            <a:r>
+              <a:rPr lang="ru-RU" dirty="0" smtClean="0"/>
+              <a:t>Разделение</a:t>
+            </a:r>
+            <a:endParaRPr lang="ru-RU" dirty="0"/>
+          </a:p>
+        </p:txBody>
+      </p:sp>
+      <p:sp>
+        <p:nvSpPr>
+          <p:cNvPr id="9" name="Объект 8"/>
+          <p:cNvSpPr>
+            <a:spLocks noGrp="1"/>
+          </p:cNvSpPr>
+          <p:nvPr>
+            <p:ph sz="quarter" idx="4"/>
+          </p:nvPr>
+        </p:nvSpPr>
+        <p:spPr>
+          <a:xfrm>
+            <a:off x="6217920" y="2582334"/>
+            <a:ext cx="5660488" cy="3378200"/>
+          </a:xfrm>
+        </p:spPr>
+        <p:txBody>
+          <a:bodyPr/>
+          <a:lstStyle/>
+          <a:p>
+            <a:pPr marL="0" indent="0">
+              <a:buNone/>
+            </a:pPr>
+            <a:r>
+              <a:rPr lang="ru-RU" dirty="0"/>
+              <a:t>	</a:t>
+            </a:r>
+            <a:r>
+              <a:rPr lang="ru-RU" dirty="0" smtClean="0"/>
+              <a:t>Чтобы </a:t>
+            </a:r>
+            <a:r>
+              <a:rPr lang="ru-RU" dirty="0"/>
+              <a:t>распределить ориентиры по разным частям </a:t>
+            </a:r>
+            <a:r>
+              <a:rPr lang="ru-RU" dirty="0" smtClean="0"/>
+              <a:t>графа можно сначала разбить граф на некоторое число частей (равное необходимому числу ориентиров), а затем выбирать вершины-ориентиры из полученных частей (руководствуясь вышеописанными стратегиями).</a:t>
+            </a:r>
+            <a:endParaRPr lang="ru-RU" dirty="0"/>
+          </a:p>
+        </p:txBody>
+      </p:sp>
+      <p:sp>
+        <p:nvSpPr>
+          <p:cNvPr id="5" name="Номер слайда 4"/>
+          <p:cNvSpPr>
+            <a:spLocks noGrp="1"/>
+          </p:cNvSpPr>
+          <p:nvPr>
+            <p:ph type="sldNum" sz="quarter" idx="12"/>
+          </p:nvPr>
+        </p:nvSpPr>
+        <p:spPr/>
+        <p:txBody>
+          <a:bodyPr/>
+          <a:lstStyle/>
+          <a:p>
+            <a:fld id="{4C26D218-B7FE-4641-BC62-5B95ECF50343}" type="slidenum">
+              <a:rPr lang="ru-RU" smtClean="0"/>
+              <a:t>9</a:t>
+            </a:fld>
+            <a:endParaRPr lang="ru-RU"/>
+          </a:p>
+        </p:txBody>
+      </p:sp>
+    </p:spTree>
+    <p:extLst>
+      <p:ext uri="{BB962C8B-B14F-4D97-AF65-F5344CB8AC3E}">
+        <p14:creationId xmlns:p14="http://schemas.microsoft.com/office/powerpoint/2010/main" val="2166186018"/>
       </p:ext>
     </p:extLst>
   </p:cSld>
@@ -4499,4 +7423,265 @@
     </a:ext>
   </a:extLst>
 </a:theme>
+</file>
+
+<file path=ppt/theme/theme2.xml><?xml version="1.0" encoding="utf-8"?>
+<a:theme xmlns:a="http://schemas.openxmlformats.org/drawingml/2006/main" name="Тема Office">
+  <a:themeElements>
+    <a:clrScheme name="Стандартная">
+      <a:dk1>
+        <a:sysClr val="windowText" lastClr="000000"/>
+      </a:dk1>
+      <a:lt1>
+        <a:sysClr val="window" lastClr="FFFFFF"/>
+      </a:lt1>
+      <a:dk2>
+        <a:srgbClr val="44546A"/>
+      </a:dk2>
+      <a:lt2>
+        <a:srgbClr val="E7E6E6"/>
+      </a:lt2>
+      <a:accent1>
+        <a:srgbClr val="5B9BD5"/>
+      </a:accent1>
+      <a:accent2>
+        <a:srgbClr val="ED7D31"/>
+      </a:accent2>
+      <a:accent3>
+        <a:srgbClr val="A5A5A5"/>
+      </a:accent3>
+      <a:accent4>
+        <a:srgbClr val="FFC000"/>
+      </a:accent4>
+      <a:accent5>
+        <a:srgbClr val="4472C4"/>
+      </a:accent5>
+      <a:accent6>
+        <a:srgbClr val="70AD47"/>
+      </a:accent6>
+      <a:hlink>
+        <a:srgbClr val="0563C1"/>
+      </a:hlink>
+      <a:folHlink>
+        <a:srgbClr val="954F72"/>
+      </a:folHlink>
+    </a:clrScheme>
+    <a:fontScheme name="Стандартная">
+      <a:majorFont>
+        <a:latin typeface="Calibri Light" panose="020F0302020204030204"/>
+        <a:ea typeface=""/>
+        <a:cs typeface=""/>
+        <a:font script="Jpan" typeface="ＭＳ Ｐゴシック"/>
+        <a:font script="Hang" typeface="맑은 고딕"/>
+        <a:font script="Hans" typeface="宋体"/>
+        <a:font script="Hant" typeface="新細明體"/>
+        <a:font script="Arab" typeface="Times New Roman"/>
+        <a:font script="Hebr" typeface="Times New Roman"/>
+        <a:font script="Thai" typeface="Angsana New"/>
+        <a:font script="Ethi" typeface="Nyala"/>
+        <a:font script="Beng" typeface="Vrinda"/>
+        <a:font script="Gujr" typeface="Shruti"/>
+        <a:font script="Khmr" typeface="MoolBoran"/>
+        <a:font script="Knda" typeface="Tunga"/>
+        <a:font script="Guru" typeface="Raavi"/>
+        <a:font script="Cans" typeface="Euphemia"/>
+        <a:font script="Cher" typeface="Plantagenet Cherokee"/>
+        <a:font script="Yiii" typeface="Microsoft Yi Baiti"/>
+        <a:font script="Tibt" typeface="Microsoft Himalaya"/>
+        <a:font script="Thaa" typeface="MV Boli"/>
+        <a:font script="Deva" typeface="Mangal"/>
+        <a:font script="Telu" typeface="Gautami"/>
+        <a:font script="Taml" typeface="Latha"/>
+        <a:font script="Syrc" typeface="Estrangelo Edessa"/>
+        <a:font script="Orya" typeface="Kalinga"/>
+        <a:font script="Mlym" typeface="Kartika"/>
+        <a:font script="Laoo" typeface="DokChampa"/>
+        <a:font script="Sinh" typeface="Iskoola Pota"/>
+        <a:font script="Mong" typeface="Mongolian Baiti"/>
+        <a:font script="Viet" typeface="Times New Roman"/>
+        <a:font script="Uigh" typeface="Microsoft Uighur"/>
+        <a:font script="Geor" typeface="Sylfaen"/>
+      </a:majorFont>
+      <a:minorFont>
+        <a:latin typeface="Calibri" panose="020F0502020204030204"/>
+        <a:ea typeface=""/>
+        <a:cs typeface=""/>
+        <a:font script="Jpan" typeface="ＭＳ Ｐゴシック"/>
+        <a:font script="Hang" typeface="맑은 고딕"/>
+        <a:font script="Hans" typeface="宋体"/>
+        <a:font script="Hant" typeface="新細明體"/>
+        <a:font script="Arab" typeface="Arial"/>
+        <a:font script="Hebr" typeface="Arial"/>
+        <a:font script="Thai" typeface="Cordia New"/>
+        <a:font script="Ethi" typeface="Nyala"/>
+        <a:font script="Beng" typeface="Vrinda"/>
+        <a:font script="Gujr" typeface="Shruti"/>
+        <a:font script="Khmr" typeface="DaunPenh"/>
+        <a:font script="Knda" typeface="Tunga"/>
+        <a:font script="Guru" typeface="Raavi"/>
+        <a:font script="Cans" typeface="Euphemia"/>
+        <a:font script="Cher" typeface="Plantagenet Cherokee"/>
+        <a:font script="Yiii" typeface="Microsoft Yi Baiti"/>
+        <a:font script="Tibt" typeface="Microsoft Himalaya"/>
+        <a:font script="Thaa" typeface="MV Boli"/>
+        <a:font script="Deva" typeface="Mangal"/>
+        <a:font script="Telu" typeface="Gautami"/>
+        <a:font script="Taml" typeface="Latha"/>
+        <a:font script="Syrc" typeface="Estrangelo Edessa"/>
+        <a:font script="Orya" typeface="Kalinga"/>
+        <a:font script="Mlym" typeface="Kartika"/>
+        <a:font script="Laoo" typeface="DokChampa"/>
+        <a:font script="Sinh" typeface="Iskoola Pota"/>
+        <a:font script="Mong" typeface="Mongolian Baiti"/>
+        <a:font script="Viet" typeface="Arial"/>
+        <a:font script="Uigh" typeface="Microsoft Uighur"/>
+        <a:font script="Geor" typeface="Sylfaen"/>
+      </a:minorFont>
+    </a:fontScheme>
+    <a:fmtScheme name="Стандартная">
+      <a:fillStyleLst>
+        <a:solidFill>
+          <a:schemeClr val="phClr"/>
+        </a:solidFill>
+        <a:gradFill rotWithShape="1">
+          <a:gsLst>
+            <a:gs pos="0">
+              <a:schemeClr val="phClr">
+                <a:lumMod val="110000"/>
+                <a:satMod val="105000"/>
+                <a:tint val="67000"/>
+              </a:schemeClr>
+            </a:gs>
+            <a:gs pos="50000">
+              <a:schemeClr val="phClr">
+                <a:lumMod val="105000"/>
+                <a:satMod val="103000"/>
+                <a:tint val="73000"/>
+              </a:schemeClr>
+            </a:gs>
+            <a:gs pos="100000">
+              <a:schemeClr val="phClr">
+                <a:lumMod val="105000"/>
+                <a:satMod val="109000"/>
+                <a:tint val="81000"/>
+              </a:schemeClr>
+            </a:gs>
+          </a:gsLst>
+          <a:lin ang="5400000" scaled="0"/>
+        </a:gradFill>
+        <a:gradFill rotWithShape="1">
+          <a:gsLst>
+            <a:gs pos="0">
+              <a:schemeClr val="phClr">
+                <a:satMod val="103000"/>
+                <a:lumMod val="102000"/>
+                <a:tint val="94000"/>
+              </a:schemeClr>
+            </a:gs>
+            <a:gs pos="50000">
+              <a:schemeClr val="phClr">
+                <a:satMod val="110000"/>
+                <a:lumMod val="100000"/>
+                <a:shade val="100000"/>
+              </a:schemeClr>
+            </a:gs>
+            <a:gs pos="100000">
+              <a:schemeClr val="phClr">
+                <a:lumMod val="99000"/>
+                <a:satMod val="120000"/>
+                <a:shade val="78000"/>
+              </a:schemeClr>
+            </a:gs>
+          </a:gsLst>
+          <a:lin ang="5400000" scaled="0"/>
+        </a:gradFill>
+      </a:fillStyleLst>
+      <a:lnStyleLst>
+        <a:ln w="6350" cap="flat" cmpd="sng" algn="ctr">
+          <a:solidFill>
+            <a:schemeClr val="phClr"/>
+          </a:solidFill>
+          <a:prstDash val="solid"/>
+          <a:miter lim="800000"/>
+        </a:ln>
+        <a:ln w="12700" cap="flat" cmpd="sng" algn="ctr">
+          <a:solidFill>
+            <a:schemeClr val="phClr"/>
+          </a:solidFill>
+          <a:prstDash val="solid"/>
+          <a:miter lim="800000"/>
+        </a:ln>
+        <a:ln w="19050" cap="flat" cmpd="sng" algn="ctr">
+          <a:solidFill>
+            <a:schemeClr val="phClr"/>
+          </a:solidFill>
+          <a:prstDash val="solid"/>
+          <a:miter lim="800000"/>
+        </a:ln>
+      </a:lnStyleLst>
+      <a:effectStyleLst>
+        <a:effectStyle>
+          <a:effectLst/>
+        </a:effectStyle>
+        <a:effectStyle>
+          <a:effectLst/>
+        </a:effectStyle>
+        <a:effectStyle>
+          <a:effectLst>
+            <a:outerShdw blurRad="57150" dist="19050" dir="5400000" algn="ctr" rotWithShape="0">
+              <a:srgbClr val="000000">
+                <a:alpha val="63000"/>
+              </a:srgbClr>
+            </a:outerShdw>
+          </a:effectLst>
+        </a:effectStyle>
+      </a:effectStyleLst>
+      <a:bgFillStyleLst>
+        <a:solidFill>
+          <a:schemeClr val="phClr"/>
+        </a:solidFill>
+        <a:solidFill>
+          <a:schemeClr val="phClr">
+            <a:tint val="95000"/>
+            <a:satMod val="170000"/>
+          </a:schemeClr>
+        </a:solidFill>
+        <a:gradFill rotWithShape="1">
+          <a:gsLst>
+            <a:gs pos="0">
+              <a:schemeClr val="phClr">
+                <a:tint val="93000"/>
+                <a:satMod val="150000"/>
+                <a:shade val="98000"/>
+                <a:lumMod val="102000"/>
+              </a:schemeClr>
+            </a:gs>
+            <a:gs pos="50000">
+              <a:schemeClr val="phClr">
+                <a:tint val="98000"/>
+                <a:satMod val="130000"/>
+                <a:shade val="90000"/>
+                <a:lumMod val="103000"/>
+              </a:schemeClr>
+            </a:gs>
+            <a:gs pos="100000">
+              <a:schemeClr val="phClr">
+                <a:shade val="63000"/>
+                <a:satMod val="120000"/>
+              </a:schemeClr>
+            </a:gs>
+          </a:gsLst>
+          <a:lin ang="5400000" scaled="0"/>
+        </a:gradFill>
+      </a:bgFillStyleLst>
+    </a:fmtScheme>
+  </a:themeElements>
+  <a:objectDefaults/>
+  <a:extraClrSchemeLst/>
+  <a:extLst>
+    <a:ext uri="{05A4C25C-085E-4340-85A3-A5531E510DB2}">
+      <thm15:themeFamily xmlns:thm15="http://schemas.microsoft.com/office/thememl/2012/main" name="Office Theme" id="{62F939B6-93AF-4DB8-9C6B-D6C7DFDC589F}" vid="{4A3C46E8-61CC-4603-A589-7422A47A8E4A}"/>
+    </a:ext>
+  </a:extLst>
+</a:theme>
 </file>
</xml_diff>